<commit_message>
Update on cost slide
</commit_message>
<xml_diff>
--- a/powerpoint/codeDeck.pptx
+++ b/powerpoint/codeDeck.pptx
@@ -113,6 +113,11 @@
       </a:defRPr>
     </a:lvl9pPr>
   </p:defaultTextStyle>
+  <p:extLst>
+    <p:ext uri="{EFAFB233-063F-42B5-8137-9DF3F51BA10A}">
+      <p15:sldGuideLst xmlns:p15="http://schemas.microsoft.com/office/powerpoint/2012/main"/>
+    </p:ext>
+  </p:extLst>
 </p:presentation>
 </file>
 
@@ -286,7 +291,7 @@
             <a:fld id="{87DE6118-2437-4B30-8E3C-4D2BE6020583}" type="datetimeFigureOut">
               <a:rPr lang="en-US" dirty="0"/>
               <a:pPr/>
-              <a:t>8/31/17</a:t>
+              <a:t>9/3/17</a:t>
             </a:fld>
             <a:endParaRPr lang="en-US" dirty="0"/>
           </a:p>
@@ -612,7 +617,7 @@
           <a:p>
             <a:fld id="{87DE6118-2437-4B30-8E3C-4D2BE6020583}" type="datetimeFigureOut">
               <a:rPr lang="en-US" dirty="0"/>
-              <a:t>8/31/17</a:t>
+              <a:t>9/3/17</a:t>
             </a:fld>
             <a:endParaRPr lang="en-US" dirty="0"/>
           </a:p>
@@ -787,7 +792,7 @@
           <a:p>
             <a:fld id="{87DE6118-2437-4B30-8E3C-4D2BE6020583}" type="datetimeFigureOut">
               <a:rPr lang="en-US" dirty="0"/>
-              <a:t>8/31/17</a:t>
+              <a:t>9/3/17</a:t>
             </a:fld>
             <a:endParaRPr lang="en-US" dirty="0"/>
           </a:p>
@@ -952,7 +957,7 @@
           <a:p>
             <a:fld id="{87DE6118-2437-4B30-8E3C-4D2BE6020583}" type="datetimeFigureOut">
               <a:rPr lang="en-US" dirty="0"/>
-              <a:t>8/31/17</a:t>
+              <a:t>9/3/17</a:t>
             </a:fld>
             <a:endParaRPr lang="en-US" dirty="0"/>
           </a:p>
@@ -1225,7 +1230,7 @@
             <a:fld id="{87DE6118-2437-4B30-8E3C-4D2BE6020583}" type="datetimeFigureOut">
               <a:rPr lang="en-US" dirty="0"/>
               <a:pPr/>
-              <a:t>8/31/17</a:t>
+              <a:t>9/3/17</a:t>
             </a:fld>
             <a:endParaRPr lang="en-US" dirty="0"/>
           </a:p>
@@ -1615,7 +1620,7 @@
           <a:p>
             <a:fld id="{87DE6118-2437-4B30-8E3C-4D2BE6020583}" type="datetimeFigureOut">
               <a:rPr lang="en-US" dirty="0"/>
-              <a:t>8/31/17</a:t>
+              <a:t>9/3/17</a:t>
             </a:fld>
             <a:endParaRPr lang="en-US" dirty="0"/>
           </a:p>
@@ -2087,7 +2092,7 @@
           <a:p>
             <a:fld id="{87DE6118-2437-4B30-8E3C-4D2BE6020583}" type="datetimeFigureOut">
               <a:rPr lang="en-US" dirty="0"/>
-              <a:t>8/31/17</a:t>
+              <a:t>9/3/17</a:t>
             </a:fld>
             <a:endParaRPr lang="en-US" dirty="0"/>
           </a:p>
@@ -2200,7 +2205,7 @@
           <a:p>
             <a:fld id="{87DE6118-2437-4B30-8E3C-4D2BE6020583}" type="datetimeFigureOut">
               <a:rPr lang="en-US" dirty="0"/>
-              <a:t>8/31/17</a:t>
+              <a:t>9/3/17</a:t>
             </a:fld>
             <a:endParaRPr lang="en-US" dirty="0"/>
           </a:p>
@@ -2290,7 +2295,7 @@
           <a:p>
             <a:fld id="{87DE6118-2437-4B30-8E3C-4D2BE6020583}" type="datetimeFigureOut">
               <a:rPr lang="en-US" dirty="0"/>
-              <a:t>8/31/17</a:t>
+              <a:t>9/3/17</a:t>
             </a:fld>
             <a:endParaRPr lang="en-US" dirty="0"/>
           </a:p>
@@ -2632,7 +2637,7 @@
             <a:fld id="{87DE6118-2437-4B30-8E3C-4D2BE6020583}" type="datetimeFigureOut">
               <a:rPr lang="en-US" dirty="0"/>
               <a:pPr/>
-              <a:t>8/31/17</a:t>
+              <a:t>9/3/17</a:t>
             </a:fld>
             <a:endParaRPr lang="en-US" dirty="0"/>
           </a:p>
@@ -3017,7 +3022,7 @@
             <a:fld id="{87DE6118-2437-4B30-8E3C-4D2BE6020583}" type="datetimeFigureOut">
               <a:rPr lang="en-US" dirty="0"/>
               <a:pPr/>
-              <a:t>8/31/17</a:t>
+              <a:t>9/3/17</a:t>
             </a:fld>
             <a:endParaRPr lang="en-US" dirty="0"/>
           </a:p>
@@ -3292,7 +3297,7 @@
             <a:fld id="{87DE6118-2437-4B30-8E3C-4D2BE6020583}" type="datetimeFigureOut">
               <a:rPr lang="en-US" dirty="0"/>
               <a:pPr/>
-              <a:t>8/31/17</a:t>
+              <a:t>9/3/17</a:t>
             </a:fld>
             <a:endParaRPr lang="en-US" dirty="0"/>
           </a:p>
@@ -5444,7 +5449,7 @@
             <a:r>
               <a:rPr lang="en-US" dirty="0">
                 <a:solidFill>
-                  <a:srgbClr val="00B050"/>
+                  <a:schemeClr val="tx1"/>
                 </a:solidFill>
               </a:rPr>
               <a:t>Estimated amount of </a:t>
@@ -5452,47 +5457,104 @@
             <a:r>
               <a:rPr lang="en-US" dirty="0" smtClean="0">
                 <a:solidFill>
-                  <a:srgbClr val="00B050"/>
+                  <a:schemeClr val="tx1"/>
                 </a:solidFill>
               </a:rPr>
-              <a:t>hours</a:t>
-            </a:r>
+              <a:t>hours initially:</a:t>
+            </a:r>
+          </a:p>
+          <a:p>
+            <a:r>
+              <a:rPr lang="en-US" dirty="0" smtClean="0">
+                <a:solidFill>
+                  <a:schemeClr val="tx1"/>
+                </a:solidFill>
+              </a:rPr>
+              <a:t>Estimated amount of hours ongoing:</a:t>
+            </a:r>
+            <a:endParaRPr lang="en-US" dirty="0" smtClean="0">
+              <a:solidFill>
+                <a:schemeClr val="tx1"/>
+              </a:solidFill>
+            </a:endParaRPr>
           </a:p>
           <a:p>
             <a:r>
               <a:rPr lang="en-US" dirty="0">
                 <a:solidFill>
-                  <a:srgbClr val="00B050"/>
+                  <a:schemeClr val="tx1"/>
                 </a:solidFill>
               </a:rPr>
-              <a:t>cost to run application for </a:t>
+              <a:t>C</a:t>
             </a:r>
             <a:r>
               <a:rPr lang="en-US" dirty="0" smtClean="0">
                 <a:solidFill>
-                  <a:srgbClr val="00B050"/>
+                  <a:schemeClr val="tx1"/>
                 </a:solidFill>
               </a:rPr>
-              <a:t>demo</a:t>
-            </a:r>
-          </a:p>
-          <a:p>
+              <a:t>ost </a:t>
+            </a:r>
             <a:r>
               <a:rPr lang="en-US" dirty="0">
                 <a:solidFill>
-                  <a:srgbClr val="00B050"/>
+                  <a:schemeClr val="tx1"/>
                 </a:solidFill>
               </a:rPr>
-              <a:t>cost of firebase with </a:t>
+              <a:t>to run application for </a:t>
             </a:r>
             <a:r>
               <a:rPr lang="en-US" dirty="0" smtClean="0">
                 <a:solidFill>
-                  <a:srgbClr val="00B050"/>
+                  <a:schemeClr val="tx1"/>
                 </a:solidFill>
               </a:rPr>
-              <a:t>thresholds</a:t>
-            </a:r>
+              <a:t>demo: $0</a:t>
+            </a:r>
+            <a:endParaRPr lang="en-US" dirty="0" smtClean="0">
+              <a:solidFill>
+                <a:schemeClr val="tx1"/>
+              </a:solidFill>
+            </a:endParaRPr>
+          </a:p>
+          <a:p>
+            <a:r>
+              <a:rPr lang="en-US" dirty="0">
+                <a:solidFill>
+                  <a:schemeClr val="tx1"/>
+                </a:solidFill>
+              </a:rPr>
+              <a:t>C</a:t>
+            </a:r>
+            <a:r>
+              <a:rPr lang="en-US" dirty="0" smtClean="0">
+                <a:solidFill>
+                  <a:schemeClr val="tx1"/>
+                </a:solidFill>
+              </a:rPr>
+              <a:t>ost </a:t>
+            </a:r>
+            <a:r>
+              <a:rPr lang="en-US" dirty="0">
+                <a:solidFill>
+                  <a:schemeClr val="tx1"/>
+                </a:solidFill>
+              </a:rPr>
+              <a:t>of firebase with </a:t>
+            </a:r>
+            <a:r>
+              <a:rPr lang="en-US" dirty="0" smtClean="0">
+                <a:solidFill>
+                  <a:schemeClr val="tx1"/>
+                </a:solidFill>
+              </a:rPr>
+              <a:t>thresholds: $0 till we reach 100k/instances for simultaneous connections and/or 50GB for storage.</a:t>
+            </a:r>
+            <a:endParaRPr lang="en-US" dirty="0" smtClean="0">
+              <a:solidFill>
+                <a:schemeClr val="tx1"/>
+              </a:solidFill>
+            </a:endParaRPr>
           </a:p>
           <a:p>
             <a:r>

</xml_diff>

<commit_message>
Update with some additional info for costs slide
</commit_message>
<xml_diff>
--- a/powerpoint/codeDeck.pptx
+++ b/powerpoint/codeDeck.pptx
@@ -291,7 +291,7 @@
             <a:fld id="{87DE6118-2437-4B30-8E3C-4D2BE6020583}" type="datetimeFigureOut">
               <a:rPr lang="en-US" dirty="0"/>
               <a:pPr/>
-              <a:t>9/3/17</a:t>
+              <a:t>9/4/17</a:t>
             </a:fld>
             <a:endParaRPr lang="en-US" dirty="0"/>
           </a:p>
@@ -617,7 +617,7 @@
           <a:p>
             <a:fld id="{87DE6118-2437-4B30-8E3C-4D2BE6020583}" type="datetimeFigureOut">
               <a:rPr lang="en-US" dirty="0"/>
-              <a:t>9/3/17</a:t>
+              <a:t>9/4/17</a:t>
             </a:fld>
             <a:endParaRPr lang="en-US" dirty="0"/>
           </a:p>
@@ -792,7 +792,7 @@
           <a:p>
             <a:fld id="{87DE6118-2437-4B30-8E3C-4D2BE6020583}" type="datetimeFigureOut">
               <a:rPr lang="en-US" dirty="0"/>
-              <a:t>9/3/17</a:t>
+              <a:t>9/4/17</a:t>
             </a:fld>
             <a:endParaRPr lang="en-US" dirty="0"/>
           </a:p>
@@ -957,7 +957,7 @@
           <a:p>
             <a:fld id="{87DE6118-2437-4B30-8E3C-4D2BE6020583}" type="datetimeFigureOut">
               <a:rPr lang="en-US" dirty="0"/>
-              <a:t>9/3/17</a:t>
+              <a:t>9/4/17</a:t>
             </a:fld>
             <a:endParaRPr lang="en-US" dirty="0"/>
           </a:p>
@@ -1230,7 +1230,7 @@
             <a:fld id="{87DE6118-2437-4B30-8E3C-4D2BE6020583}" type="datetimeFigureOut">
               <a:rPr lang="en-US" dirty="0"/>
               <a:pPr/>
-              <a:t>9/3/17</a:t>
+              <a:t>9/4/17</a:t>
             </a:fld>
             <a:endParaRPr lang="en-US" dirty="0"/>
           </a:p>
@@ -1620,7 +1620,7 @@
           <a:p>
             <a:fld id="{87DE6118-2437-4B30-8E3C-4D2BE6020583}" type="datetimeFigureOut">
               <a:rPr lang="en-US" dirty="0"/>
-              <a:t>9/3/17</a:t>
+              <a:t>9/4/17</a:t>
             </a:fld>
             <a:endParaRPr lang="en-US" dirty="0"/>
           </a:p>
@@ -2092,7 +2092,7 @@
           <a:p>
             <a:fld id="{87DE6118-2437-4B30-8E3C-4D2BE6020583}" type="datetimeFigureOut">
               <a:rPr lang="en-US" dirty="0"/>
-              <a:t>9/3/17</a:t>
+              <a:t>9/4/17</a:t>
             </a:fld>
             <a:endParaRPr lang="en-US" dirty="0"/>
           </a:p>
@@ -2205,7 +2205,7 @@
           <a:p>
             <a:fld id="{87DE6118-2437-4B30-8E3C-4D2BE6020583}" type="datetimeFigureOut">
               <a:rPr lang="en-US" dirty="0"/>
-              <a:t>9/3/17</a:t>
+              <a:t>9/4/17</a:t>
             </a:fld>
             <a:endParaRPr lang="en-US" dirty="0"/>
           </a:p>
@@ -2295,7 +2295,7 @@
           <a:p>
             <a:fld id="{87DE6118-2437-4B30-8E3C-4D2BE6020583}" type="datetimeFigureOut">
               <a:rPr lang="en-US" dirty="0"/>
-              <a:t>9/3/17</a:t>
+              <a:t>9/4/17</a:t>
             </a:fld>
             <a:endParaRPr lang="en-US" dirty="0"/>
           </a:p>
@@ -2637,7 +2637,7 @@
             <a:fld id="{87DE6118-2437-4B30-8E3C-4D2BE6020583}" type="datetimeFigureOut">
               <a:rPr lang="en-US" dirty="0"/>
               <a:pPr/>
-              <a:t>9/3/17</a:t>
+              <a:t>9/4/17</a:t>
             </a:fld>
             <a:endParaRPr lang="en-US" dirty="0"/>
           </a:p>
@@ -3022,7 +3022,7 @@
             <a:fld id="{87DE6118-2437-4B30-8E3C-4D2BE6020583}" type="datetimeFigureOut">
               <a:rPr lang="en-US" dirty="0"/>
               <a:pPr/>
-              <a:t>9/3/17</a:t>
+              <a:t>9/4/17</a:t>
             </a:fld>
             <a:endParaRPr lang="en-US" dirty="0"/>
           </a:p>
@@ -3297,7 +3297,7 @@
             <a:fld id="{87DE6118-2437-4B30-8E3C-4D2BE6020583}" type="datetimeFigureOut">
               <a:rPr lang="en-US" dirty="0"/>
               <a:pPr/>
-              <a:t>9/3/17</a:t>
+              <a:t>9/4/17</a:t>
             </a:fld>
             <a:endParaRPr lang="en-US" dirty="0"/>
           </a:p>
@@ -3938,28 +3938,58 @@
           <a:p>
             <a:r>
               <a:rPr lang="en-US" dirty="0" smtClean="0"/>
-              <a:t>Define all basic feature vs all possible additional features.</a:t>
-            </a:r>
-          </a:p>
-          <a:p>
-            <a:r>
-              <a:rPr lang="en-US" dirty="0" smtClean="0"/>
-              <a:t>Knowing your endpoint of your work and being able to communicate to others.</a:t>
-            </a:r>
-          </a:p>
-          <a:p>
-            <a:r>
-              <a:rPr lang="en-US" dirty="0" smtClean="0"/>
-              <a:t>Knowing how to and utilizing </a:t>
-            </a:r>
-            <a:r>
-              <a:rPr lang="en-US" dirty="0" err="1" smtClean="0"/>
-              <a:t>Git</a:t>
-            </a:r>
-            <a:r>
-              <a:rPr lang="en-US" dirty="0" smtClean="0"/>
-              <a:t> to correctly pull and push to branches.</a:t>
-            </a:r>
+              <a:t>Define all basic feature vs all possible additional </a:t>
+            </a:r>
+            <a:r>
+              <a:rPr lang="en-US" dirty="0" smtClean="0"/>
+              <a:t>features (Sprint Planning Meetings).</a:t>
+            </a:r>
+            <a:endParaRPr lang="en-US" dirty="0" smtClean="0"/>
+          </a:p>
+          <a:p>
+            <a:r>
+              <a:rPr lang="en-US" dirty="0" smtClean="0"/>
+              <a:t>Knowing your </a:t>
+            </a:r>
+            <a:r>
+              <a:rPr lang="en-US" dirty="0" smtClean="0"/>
+              <a:t>scope </a:t>
+            </a:r>
+            <a:r>
+              <a:rPr lang="en-US" dirty="0" smtClean="0"/>
+              <a:t>of </a:t>
+            </a:r>
+            <a:r>
+              <a:rPr lang="en-US" dirty="0" smtClean="0"/>
+              <a:t>work </a:t>
+            </a:r>
+            <a:r>
+              <a:rPr lang="en-US" dirty="0" smtClean="0"/>
+              <a:t>and being able to communicate to others.</a:t>
+            </a:r>
+          </a:p>
+          <a:p>
+            <a:r>
+              <a:rPr lang="en-US" dirty="0" smtClean="0"/>
+              <a:t>Learning </a:t>
+            </a:r>
+            <a:r>
+              <a:rPr lang="en-US" dirty="0" smtClean="0"/>
+              <a:t>how to </a:t>
+            </a:r>
+            <a:r>
+              <a:rPr lang="en-US" dirty="0" smtClean="0"/>
+              <a:t>correctly </a:t>
+            </a:r>
+            <a:r>
+              <a:rPr lang="en-US" dirty="0" smtClean="0"/>
+              <a:t>pull and push to </a:t>
+            </a:r>
+            <a:r>
+              <a:rPr lang="en-US" dirty="0" smtClean="0"/>
+              <a:t>branches to ensure no interferences or setbacks.</a:t>
+            </a:r>
+            <a:endParaRPr lang="en-US" dirty="0" smtClean="0"/>
           </a:p>
         </p:txBody>
       </p:sp>
@@ -4282,13 +4312,13 @@
         </p:nvSpPr>
         <p:spPr>
           <a:xfrm>
-            <a:off x="1371600" y="1586753"/>
-            <a:ext cx="4773706" cy="5138137"/>
+            <a:off x="1371599" y="1586753"/>
+            <a:ext cx="4976949" cy="5138137"/>
           </a:xfrm>
         </p:spPr>
         <p:txBody>
           <a:bodyPr>
-            <a:normAutofit fontScale="92500" lnSpcReduction="20000"/>
+            <a:normAutofit fontScale="85000" lnSpcReduction="20000"/>
           </a:bodyPr>
           <a:lstStyle/>
           <a:p>
@@ -4357,34 +4387,30 @@
           <a:p>
             <a:pPr lvl="1"/>
             <a:r>
-              <a:rPr lang="en-US" dirty="0"/>
-              <a:t>Create </a:t>
-            </a:r>
-            <a:r>
-              <a:rPr lang="en-US" dirty="0" smtClean="0"/>
-              <a:t>Wireframe</a:t>
-            </a:r>
-            <a:r>
-              <a:rPr lang="en-US" dirty="0"/>
-              <a:t>, HTML, and CSS</a:t>
-            </a:r>
+              <a:rPr lang="en-US" dirty="0" smtClean="0"/>
+              <a:t>Daily Standups/Sprint Planning Meetings</a:t>
+            </a:r>
+            <a:endParaRPr lang="en-US" dirty="0" smtClean="0"/>
           </a:p>
           <a:p>
             <a:pPr lvl="1"/>
             <a:r>
-              <a:rPr lang="en-US" dirty="0"/>
+              <a:rPr lang="en-US" dirty="0" smtClean="0"/>
+              <a:t>Create Wireframe, HTML, and CSS</a:t>
+            </a:r>
+          </a:p>
+          <a:p>
+            <a:pPr lvl="1"/>
+            <a:r>
+              <a:rPr lang="en-US" dirty="0" smtClean="0"/>
               <a:t>Research APIs/Implementation</a:t>
             </a:r>
           </a:p>
           <a:p>
             <a:pPr lvl="1"/>
             <a:r>
-              <a:rPr lang="en-US" dirty="0"/>
-              <a:t>Pseudocode </a:t>
-            </a:r>
-            <a:r>
-              <a:rPr lang="en-US" dirty="0" smtClean="0"/>
-              <a:t>and Write JavaScript</a:t>
+              <a:rPr lang="en-US" dirty="0" smtClean="0"/>
+              <a:t>Pseudocode and Write JavaScript</a:t>
             </a:r>
           </a:p>
           <a:p>
@@ -4397,37 +4423,29 @@
           <a:p>
             <a:pPr lvl="1"/>
             <a:r>
-              <a:rPr lang="en-US" dirty="0"/>
+              <a:rPr lang="en-US" dirty="0" smtClean="0"/>
               <a:t>Connecting HTML and JavaScript</a:t>
             </a:r>
           </a:p>
           <a:p>
             <a:pPr lvl="1"/>
             <a:r>
-              <a:rPr lang="en-US" dirty="0"/>
+              <a:rPr lang="en-US" dirty="0" smtClean="0"/>
               <a:t>Debugging</a:t>
             </a:r>
           </a:p>
           <a:p>
             <a:pPr lvl="1"/>
             <a:r>
-              <a:rPr lang="en-US" dirty="0"/>
-              <a:t>Add/Discussion of New </a:t>
-            </a:r>
-            <a:r>
-              <a:rPr lang="en-US" dirty="0" smtClean="0"/>
-              <a:t>Features</a:t>
+              <a:rPr lang="en-US" dirty="0" smtClean="0"/>
+              <a:t>Add/Discussion of New Features</a:t>
             </a:r>
           </a:p>
           <a:p>
             <a:pPr lvl="1"/>
             <a:r>
-              <a:rPr lang="en-US" dirty="0"/>
-              <a:t>Marketing </a:t>
-            </a:r>
-            <a:r>
-              <a:rPr lang="en-US" dirty="0" smtClean="0"/>
-              <a:t>Plan</a:t>
+              <a:rPr lang="en-US" dirty="0" smtClean="0"/>
+              <a:t>Marketing Plan</a:t>
             </a:r>
             <a:endParaRPr lang="en-US" dirty="0"/>
           </a:p>
@@ -4443,7 +4461,7 @@
         </p:nvSpPr>
         <p:spPr>
           <a:xfrm>
-            <a:off x="6445623" y="1586752"/>
+            <a:off x="6642847" y="1566775"/>
             <a:ext cx="4329953" cy="5138137"/>
           </a:xfrm>
           <a:prstGeom prst="rect">
@@ -4648,8 +4666,9 @@
           <a:p>
             <a:r>
               <a:rPr lang="en-US" dirty="0" smtClean="0"/>
-              <a:t>Initial Deployment</a:t>
-            </a:r>
+              <a:t>Deployment</a:t>
+            </a:r>
+            <a:endParaRPr lang="en-US" dirty="0" smtClean="0"/>
           </a:p>
           <a:p>
             <a:pPr lvl="1"/>
@@ -4780,7 +4799,9 @@
         </p:nvSpPr>
         <p:spPr/>
         <p:txBody>
-          <a:bodyPr/>
+          <a:bodyPr>
+            <a:normAutofit fontScale="70000" lnSpcReduction="20000"/>
+          </a:bodyPr>
           <a:lstStyle/>
           <a:p>
             <a:r>
@@ -4907,7 +4928,65 @@
             </a:r>
             <a:r>
               <a:rPr lang="en-US" dirty="0" smtClean="0"/>
-              <a:t> Create logo.</a:t>
+              <a:t> Create logo</a:t>
+            </a:r>
+            <a:r>
+              <a:rPr lang="en-US" dirty="0" smtClean="0"/>
+              <a:t>.</a:t>
+            </a:r>
+          </a:p>
+          <a:p>
+            <a:r>
+              <a:rPr lang="en-US" dirty="0" smtClean="0"/>
+              <a:t>Trello </a:t>
+            </a:r>
+            <a:r>
+              <a:rPr lang="mr-IN" dirty="0" smtClean="0"/>
+              <a:t>–</a:t>
+            </a:r>
+            <a:r>
+              <a:rPr lang="en-US" dirty="0" smtClean="0"/>
+              <a:t> Lay out and assigning tasks.</a:t>
+            </a:r>
+          </a:p>
+          <a:p>
+            <a:r>
+              <a:rPr lang="en-US" dirty="0" err="1" smtClean="0"/>
+              <a:t>GitKraken</a:t>
+            </a:r>
+            <a:r>
+              <a:rPr lang="en-US" dirty="0" smtClean="0"/>
+              <a:t> </a:t>
+            </a:r>
+            <a:r>
+              <a:rPr lang="mr-IN" dirty="0" smtClean="0"/>
+              <a:t>–</a:t>
+            </a:r>
+            <a:r>
+              <a:rPr lang="en-US" dirty="0" smtClean="0"/>
+              <a:t> GUI (Graphical User Interface) version control interface.</a:t>
+            </a:r>
+          </a:p>
+          <a:p>
+            <a:r>
+              <a:rPr lang="en-US" dirty="0" smtClean="0"/>
+              <a:t>GitHub - </a:t>
+            </a:r>
+            <a:r>
+              <a:rPr lang="en-US" dirty="0"/>
+              <a:t>V</a:t>
+            </a:r>
+            <a:r>
+              <a:rPr lang="en-US" dirty="0" smtClean="0"/>
+              <a:t>ersion </a:t>
+            </a:r>
+            <a:r>
+              <a:rPr lang="en-US" dirty="0"/>
+              <a:t>control and source code </a:t>
+            </a:r>
+            <a:r>
+              <a:rPr lang="en-US" dirty="0" smtClean="0"/>
+              <a:t>management system.</a:t>
             </a:r>
             <a:endParaRPr lang="en-US" dirty="0"/>
           </a:p>
@@ -5358,14 +5437,38 @@
             <a:r>
               <a:rPr lang="en-US" dirty="0" smtClean="0">
                 <a:solidFill>
-                  <a:srgbClr val="00B050"/>
+                  <a:schemeClr val="tx1"/>
                 </a:solidFill>
               </a:rPr>
-              <a:t>will we offer online version on top of download or just download????</a:t>
+              <a:t>We w</a:t>
+            </a:r>
+            <a:r>
+              <a:rPr lang="en-US" dirty="0" smtClean="0">
+                <a:solidFill>
+                  <a:schemeClr val="tx1"/>
+                </a:solidFill>
+              </a:rPr>
+              <a:t>ill offer </a:t>
+            </a:r>
+            <a:r>
+              <a:rPr lang="en-US" dirty="0" smtClean="0">
+                <a:solidFill>
+                  <a:schemeClr val="tx1"/>
+                </a:solidFill>
+              </a:rPr>
+              <a:t>online version on top </a:t>
+            </a:r>
+            <a:r>
+              <a:rPr lang="en-US" dirty="0" smtClean="0">
+                <a:solidFill>
+                  <a:schemeClr val="tx1"/>
+                </a:solidFill>
+              </a:rPr>
+              <a:t>of download version.</a:t>
             </a:r>
             <a:endParaRPr lang="en-US" dirty="0">
               <a:solidFill>
-                <a:srgbClr val="00B050"/>
+                <a:schemeClr val="tx1"/>
               </a:solidFill>
             </a:endParaRPr>
           </a:p>
@@ -5443,7 +5546,9 @@
         </p:nvSpPr>
         <p:spPr/>
         <p:txBody>
-          <a:bodyPr/>
+          <a:bodyPr>
+            <a:normAutofit/>
+          </a:bodyPr>
           <a:lstStyle/>
           <a:p>
             <a:r>
@@ -5471,124 +5576,116 @@
                 </a:solidFill>
               </a:rPr>
               <a:t>Estimated amount of hours ongoing:</a:t>
+            </a:r>
+          </a:p>
+          <a:p>
+            <a:r>
+              <a:rPr lang="en-US" dirty="0">
+                <a:solidFill>
+                  <a:schemeClr val="tx1"/>
+                </a:solidFill>
+              </a:rPr>
+              <a:t>C</a:t>
+            </a:r>
+            <a:r>
+              <a:rPr lang="en-US" dirty="0" smtClean="0">
+                <a:solidFill>
+                  <a:schemeClr val="tx1"/>
+                </a:solidFill>
+              </a:rPr>
+              <a:t>ost </a:t>
+            </a:r>
+            <a:r>
+              <a:rPr lang="en-US" dirty="0">
+                <a:solidFill>
+                  <a:schemeClr val="tx1"/>
+                </a:solidFill>
+              </a:rPr>
+              <a:t>to run application for </a:t>
+            </a:r>
+            <a:r>
+              <a:rPr lang="en-US" dirty="0" smtClean="0">
+                <a:solidFill>
+                  <a:schemeClr val="tx1"/>
+                </a:solidFill>
+              </a:rPr>
+              <a:t>demo: $0</a:t>
+            </a:r>
+          </a:p>
+          <a:p>
+            <a:r>
+              <a:rPr lang="en-US" dirty="0" smtClean="0">
+                <a:solidFill>
+                  <a:schemeClr val="tx1"/>
+                </a:solidFill>
+              </a:rPr>
+              <a:t>Firebase: </a:t>
+            </a:r>
+            <a:r>
+              <a:rPr lang="en-US" dirty="0" smtClean="0">
+                <a:solidFill>
+                  <a:schemeClr val="tx1"/>
+                </a:solidFill>
+              </a:rPr>
+              <a:t>$0 </a:t>
+            </a:r>
+            <a:r>
+              <a:rPr lang="en-US" dirty="0" smtClean="0">
+                <a:solidFill>
+                  <a:schemeClr val="tx1"/>
+                </a:solidFill>
+              </a:rPr>
+              <a:t>otherwise $25/year for 100k/instances </a:t>
+            </a:r>
+            <a:r>
+              <a:rPr lang="en-US" dirty="0" smtClean="0">
+                <a:solidFill>
+                  <a:schemeClr val="tx1"/>
+                </a:solidFill>
+              </a:rPr>
+              <a:t>for simultaneous connections and/or 50GB for storage.</a:t>
+            </a:r>
+          </a:p>
+          <a:p>
+            <a:r>
+              <a:rPr lang="en-US" dirty="0" smtClean="0">
+                <a:solidFill>
+                  <a:schemeClr val="tx1"/>
+                </a:solidFill>
+              </a:rPr>
+              <a:t>Domain (Google): $12/year </a:t>
+            </a:r>
+          </a:p>
+          <a:p>
+            <a:r>
+              <a:rPr lang="en-US" dirty="0" smtClean="0">
+                <a:solidFill>
+                  <a:schemeClr val="tx1"/>
+                </a:solidFill>
+              </a:rPr>
+              <a:t>Web Service Provider (AWS S3): $0 up to 20,000 GET Requests otherwise $0.023 per GB and </a:t>
+            </a:r>
+            <a:r>
+              <a:rPr lang="en-US" dirty="0"/>
+              <a:t>$0.004 per 10,000 </a:t>
+            </a:r>
+            <a:r>
+              <a:rPr lang="en-US" dirty="0" smtClean="0"/>
+              <a:t>GET Requests</a:t>
+            </a:r>
+            <a:r>
+              <a:rPr lang="en-US" dirty="0" smtClean="0">
+                <a:solidFill>
+                  <a:schemeClr val="tx1"/>
+                </a:solidFill>
+              </a:rPr>
+              <a:t>.</a:t>
             </a:r>
             <a:endParaRPr lang="en-US" dirty="0" smtClean="0">
               <a:solidFill>
                 <a:schemeClr val="tx1"/>
               </a:solidFill>
             </a:endParaRPr>
-          </a:p>
-          <a:p>
-            <a:r>
-              <a:rPr lang="en-US" dirty="0">
-                <a:solidFill>
-                  <a:schemeClr val="tx1"/>
-                </a:solidFill>
-              </a:rPr>
-              <a:t>C</a:t>
-            </a:r>
-            <a:r>
-              <a:rPr lang="en-US" dirty="0" smtClean="0">
-                <a:solidFill>
-                  <a:schemeClr val="tx1"/>
-                </a:solidFill>
-              </a:rPr>
-              <a:t>ost </a:t>
-            </a:r>
-            <a:r>
-              <a:rPr lang="en-US" dirty="0">
-                <a:solidFill>
-                  <a:schemeClr val="tx1"/>
-                </a:solidFill>
-              </a:rPr>
-              <a:t>to run application for </a:t>
-            </a:r>
-            <a:r>
-              <a:rPr lang="en-US" dirty="0" smtClean="0">
-                <a:solidFill>
-                  <a:schemeClr val="tx1"/>
-                </a:solidFill>
-              </a:rPr>
-              <a:t>demo: $0</a:t>
-            </a:r>
-            <a:endParaRPr lang="en-US" dirty="0" smtClean="0">
-              <a:solidFill>
-                <a:schemeClr val="tx1"/>
-              </a:solidFill>
-            </a:endParaRPr>
-          </a:p>
-          <a:p>
-            <a:r>
-              <a:rPr lang="en-US" dirty="0">
-                <a:solidFill>
-                  <a:schemeClr val="tx1"/>
-                </a:solidFill>
-              </a:rPr>
-              <a:t>C</a:t>
-            </a:r>
-            <a:r>
-              <a:rPr lang="en-US" dirty="0" smtClean="0">
-                <a:solidFill>
-                  <a:schemeClr val="tx1"/>
-                </a:solidFill>
-              </a:rPr>
-              <a:t>ost </a:t>
-            </a:r>
-            <a:r>
-              <a:rPr lang="en-US" dirty="0">
-                <a:solidFill>
-                  <a:schemeClr val="tx1"/>
-                </a:solidFill>
-              </a:rPr>
-              <a:t>of firebase with </a:t>
-            </a:r>
-            <a:r>
-              <a:rPr lang="en-US" dirty="0" smtClean="0">
-                <a:solidFill>
-                  <a:schemeClr val="tx1"/>
-                </a:solidFill>
-              </a:rPr>
-              <a:t>thresholds: $0 till we reach 100k/instances for simultaneous connections and/or 50GB for storage.</a:t>
-            </a:r>
-            <a:endParaRPr lang="en-US" dirty="0" smtClean="0">
-              <a:solidFill>
-                <a:schemeClr val="tx1"/>
-              </a:solidFill>
-            </a:endParaRPr>
-          </a:p>
-          <a:p>
-            <a:r>
-              <a:rPr lang="en-US" dirty="0">
-                <a:solidFill>
-                  <a:srgbClr val="00B050"/>
-                </a:solidFill>
-              </a:rPr>
-              <a:t>how to distribute (</a:t>
-            </a:r>
-            <a:r>
-              <a:rPr lang="en-US" dirty="0" err="1">
-                <a:solidFill>
-                  <a:srgbClr val="00B050"/>
-                </a:solidFill>
-              </a:rPr>
-              <a:t>Github</a:t>
-            </a:r>
-            <a:r>
-              <a:rPr lang="en-US" dirty="0">
-                <a:solidFill>
-                  <a:srgbClr val="00B050"/>
-                </a:solidFill>
-              </a:rPr>
-              <a:t>, or own server?</a:t>
-            </a:r>
-            <a:endParaRPr lang="en-US" dirty="0" smtClean="0">
-              <a:solidFill>
-                <a:srgbClr val="00B050"/>
-              </a:solidFill>
-            </a:endParaRPr>
-          </a:p>
-          <a:p>
-            <a:endParaRPr lang="en-US" dirty="0"/>
           </a:p>
         </p:txBody>
       </p:sp>

</xml_diff>

<commit_message>
Included updates to cost and group milestone
</commit_message>
<xml_diff>
--- a/powerpoint/codeDeck.pptx
+++ b/powerpoint/codeDeck.pptx
@@ -6,15 +6,16 @@
   </p:sldMasterIdLst>
   <p:sldIdLst>
     <p:sldId id="256" r:id="rId2"/>
-    <p:sldId id="257" r:id="rId3"/>
-    <p:sldId id="259" r:id="rId4"/>
-    <p:sldId id="260" r:id="rId5"/>
-    <p:sldId id="261" r:id="rId6"/>
-    <p:sldId id="262" r:id="rId7"/>
-    <p:sldId id="263" r:id="rId8"/>
-    <p:sldId id="258" r:id="rId9"/>
-    <p:sldId id="265" r:id="rId10"/>
-    <p:sldId id="264" r:id="rId11"/>
+    <p:sldId id="266" r:id="rId3"/>
+    <p:sldId id="257" r:id="rId4"/>
+    <p:sldId id="259" r:id="rId5"/>
+    <p:sldId id="260" r:id="rId6"/>
+    <p:sldId id="261" r:id="rId7"/>
+    <p:sldId id="262" r:id="rId8"/>
+    <p:sldId id="263" r:id="rId9"/>
+    <p:sldId id="258" r:id="rId10"/>
+    <p:sldId id="265" r:id="rId11"/>
+    <p:sldId id="264" r:id="rId12"/>
   </p:sldIdLst>
   <p:sldSz cx="12192000" cy="6858000"/>
   <p:notesSz cx="6858000" cy="9144000"/>
@@ -3909,7 +3910,7 @@
           <a:p>
             <a:r>
               <a:rPr lang="en-US" dirty="0" smtClean="0"/>
-              <a:t>Milestones</a:t>
+              <a:t>Cost</a:t>
             </a:r>
             <a:endParaRPr lang="en-US" dirty="0"/>
           </a:p>
@@ -3927,12 +3928,248 @@
         </p:nvSpPr>
         <p:spPr/>
         <p:txBody>
-          <a:bodyPr/>
+          <a:bodyPr>
+            <a:normAutofit/>
+          </a:bodyPr>
           <a:lstStyle/>
           <a:p>
             <a:r>
-              <a:rPr lang="en-US" dirty="0" smtClean="0"/>
-              <a:t>API’s that will not work within our scope.</a:t>
+              <a:rPr lang="en-US" dirty="0">
+                <a:solidFill>
+                  <a:schemeClr val="tx1"/>
+                </a:solidFill>
+              </a:rPr>
+              <a:t>Estimated amount of </a:t>
+            </a:r>
+            <a:r>
+              <a:rPr lang="en-US" dirty="0" smtClean="0">
+                <a:solidFill>
+                  <a:schemeClr val="tx1"/>
+                </a:solidFill>
+              </a:rPr>
+              <a:t>hours initially</a:t>
+            </a:r>
+            <a:r>
+              <a:rPr lang="en-US" dirty="0" smtClean="0">
+                <a:solidFill>
+                  <a:schemeClr val="tx1"/>
+                </a:solidFill>
+              </a:rPr>
+              <a:t>: Estimate of 120 hours total for 4 people in one week.</a:t>
+            </a:r>
+          </a:p>
+          <a:p>
+            <a:r>
+              <a:rPr lang="en-US" dirty="0" smtClean="0">
+                <a:solidFill>
+                  <a:schemeClr val="tx1"/>
+                </a:solidFill>
+              </a:rPr>
+              <a:t>Estimated </a:t>
+            </a:r>
+            <a:r>
+              <a:rPr lang="en-US" dirty="0" smtClean="0">
+                <a:solidFill>
+                  <a:schemeClr val="tx1"/>
+                </a:solidFill>
+              </a:rPr>
+              <a:t>amount of hours ongoing:</a:t>
+            </a:r>
+          </a:p>
+          <a:p>
+            <a:r>
+              <a:rPr lang="en-US" dirty="0">
+                <a:solidFill>
+                  <a:schemeClr val="tx1"/>
+                </a:solidFill>
+              </a:rPr>
+              <a:t>C</a:t>
+            </a:r>
+            <a:r>
+              <a:rPr lang="en-US" dirty="0" smtClean="0">
+                <a:solidFill>
+                  <a:schemeClr val="tx1"/>
+                </a:solidFill>
+              </a:rPr>
+              <a:t>ost </a:t>
+            </a:r>
+            <a:r>
+              <a:rPr lang="en-US" dirty="0">
+                <a:solidFill>
+                  <a:schemeClr val="tx1"/>
+                </a:solidFill>
+              </a:rPr>
+              <a:t>to run application for </a:t>
+            </a:r>
+            <a:r>
+              <a:rPr lang="en-US" dirty="0" smtClean="0">
+                <a:solidFill>
+                  <a:schemeClr val="tx1"/>
+                </a:solidFill>
+              </a:rPr>
+              <a:t>demo: $0</a:t>
+            </a:r>
+          </a:p>
+          <a:p>
+            <a:r>
+              <a:rPr lang="en-US" dirty="0" smtClean="0">
+                <a:solidFill>
+                  <a:schemeClr val="tx1"/>
+                </a:solidFill>
+              </a:rPr>
+              <a:t>Firebase: </a:t>
+            </a:r>
+            <a:r>
+              <a:rPr lang="en-US" dirty="0" smtClean="0">
+                <a:solidFill>
+                  <a:schemeClr val="tx1"/>
+                </a:solidFill>
+              </a:rPr>
+              <a:t>$0 </a:t>
+            </a:r>
+            <a:r>
+              <a:rPr lang="en-US" dirty="0" smtClean="0">
+                <a:solidFill>
+                  <a:schemeClr val="tx1"/>
+                </a:solidFill>
+              </a:rPr>
+              <a:t>otherwise $25/year for 100k/instances </a:t>
+            </a:r>
+            <a:r>
+              <a:rPr lang="en-US" dirty="0" smtClean="0">
+                <a:solidFill>
+                  <a:schemeClr val="tx1"/>
+                </a:solidFill>
+              </a:rPr>
+              <a:t>for simultaneous connections and/or 50GB for storage.</a:t>
+            </a:r>
+          </a:p>
+          <a:p>
+            <a:r>
+              <a:rPr lang="en-US" dirty="0" smtClean="0">
+                <a:solidFill>
+                  <a:schemeClr val="tx1"/>
+                </a:solidFill>
+              </a:rPr>
+              <a:t>Domain (Google): $12/year </a:t>
+            </a:r>
+          </a:p>
+          <a:p>
+            <a:r>
+              <a:rPr lang="en-US" dirty="0" smtClean="0">
+                <a:solidFill>
+                  <a:schemeClr val="tx1"/>
+                </a:solidFill>
+              </a:rPr>
+              <a:t>Web Service Provider (AWS S3): $0 up to 20,000 GET Requests otherwise $0.023 per GB and </a:t>
+            </a:r>
+            <a:r>
+              <a:rPr lang="en-US" dirty="0"/>
+              <a:t>$0.004 per 10,000 </a:t>
+            </a:r>
+            <a:r>
+              <a:rPr lang="en-US" dirty="0" smtClean="0"/>
+              <a:t>GET Requests</a:t>
+            </a:r>
+            <a:r>
+              <a:rPr lang="en-US" dirty="0" smtClean="0">
+                <a:solidFill>
+                  <a:schemeClr val="tx1"/>
+                </a:solidFill>
+              </a:rPr>
+              <a:t>.</a:t>
+            </a:r>
+            <a:endParaRPr lang="en-US" dirty="0" smtClean="0">
+              <a:solidFill>
+                <a:schemeClr val="tx1"/>
+              </a:solidFill>
+            </a:endParaRPr>
+          </a:p>
+        </p:txBody>
+      </p:sp>
+    </p:spTree>
+    <p:extLst>
+      <p:ext uri="{BB962C8B-B14F-4D97-AF65-F5344CB8AC3E}">
+        <p14:creationId xmlns:p14="http://schemas.microsoft.com/office/powerpoint/2010/main" val="1992923292"/>
+      </p:ext>
+    </p:extLst>
+  </p:cSld>
+  <p:clrMapOvr>
+    <a:masterClrMapping/>
+  </p:clrMapOvr>
+</p:sld>
+</file>
+
+<file path=ppt/slides/slide11.xml><?xml version="1.0" encoding="utf-8"?>
+<p:sld xmlns:a="http://schemas.openxmlformats.org/drawingml/2006/main" xmlns:r="http://schemas.openxmlformats.org/officeDocument/2006/relationships" xmlns:p="http://schemas.openxmlformats.org/presentationml/2006/main">
+  <p:cSld>
+    <p:spTree>
+      <p:nvGrpSpPr>
+        <p:cNvPr id="1" name=""/>
+        <p:cNvGrpSpPr/>
+        <p:nvPr/>
+      </p:nvGrpSpPr>
+      <p:grpSpPr>
+        <a:xfrm>
+          <a:off x="0" y="0"/>
+          <a:ext cx="0" cy="0"/>
+          <a:chOff x="0" y="0"/>
+          <a:chExt cx="0" cy="0"/>
+        </a:xfrm>
+      </p:grpSpPr>
+      <p:sp>
+        <p:nvSpPr>
+          <p:cNvPr id="2" name="Title 1"/>
+          <p:cNvSpPr>
+            <a:spLocks noGrp="1"/>
+          </p:cNvSpPr>
+          <p:nvPr>
+            <p:ph type="title"/>
+          </p:nvPr>
+        </p:nvSpPr>
+        <p:spPr/>
+        <p:txBody>
+          <a:bodyPr/>
+          <a:lstStyle/>
+          <a:p>
+            <a:r>
+              <a:rPr lang="en-US" dirty="0" smtClean="0"/>
+              <a:t>Group Milestones</a:t>
+            </a:r>
+            <a:endParaRPr lang="en-US" dirty="0"/>
+          </a:p>
+        </p:txBody>
+      </p:sp>
+      <p:sp>
+        <p:nvSpPr>
+          <p:cNvPr id="3" name="Content Placeholder 2"/>
+          <p:cNvSpPr>
+            <a:spLocks noGrp="1"/>
+          </p:cNvSpPr>
+          <p:nvPr>
+            <p:ph idx="1"/>
+          </p:nvPr>
+        </p:nvSpPr>
+        <p:spPr/>
+        <p:txBody>
+          <a:bodyPr/>
+          <a:lstStyle/>
+          <a:p>
+            <a:r>
+              <a:rPr lang="en-US" dirty="0" smtClean="0"/>
+              <a:t>Identifying API’s </a:t>
+            </a:r>
+            <a:r>
+              <a:rPr lang="en-US" dirty="0" smtClean="0"/>
+              <a:t>that will </a:t>
+            </a:r>
+            <a:r>
+              <a:rPr lang="en-US" dirty="0" smtClean="0"/>
+              <a:t>work </a:t>
+            </a:r>
+            <a:r>
+              <a:rPr lang="en-US" dirty="0" smtClean="0"/>
+              <a:t>within our scope.</a:t>
             </a:r>
           </a:p>
           <a:p>
@@ -3942,30 +4179,22 @@
             </a:r>
             <a:r>
               <a:rPr lang="en-US" dirty="0" smtClean="0"/>
-              <a:t>features (Sprint Planning Meetings).</a:t>
+              <a:t>features (</a:t>
+            </a:r>
+            <a:r>
+              <a:rPr lang="en-US" dirty="0" smtClean="0"/>
+              <a:t>integrate</a:t>
+            </a:r>
+            <a:r>
+              <a:rPr lang="en-US" dirty="0" smtClean="0"/>
+              <a:t> Sprint Planning Meetings and Daily Stand Ups).</a:t>
             </a:r>
             <a:endParaRPr lang="en-US" dirty="0" smtClean="0"/>
           </a:p>
           <a:p>
             <a:r>
               <a:rPr lang="en-US" dirty="0" smtClean="0"/>
-              <a:t>Knowing your </a:t>
-            </a:r>
-            <a:r>
-              <a:rPr lang="en-US" dirty="0" smtClean="0"/>
-              <a:t>scope </a:t>
-            </a:r>
-            <a:r>
-              <a:rPr lang="en-US" dirty="0" smtClean="0"/>
-              <a:t>of </a:t>
-            </a:r>
-            <a:r>
-              <a:rPr lang="en-US" dirty="0" smtClean="0"/>
-              <a:t>work </a:t>
-            </a:r>
-            <a:r>
-              <a:rPr lang="en-US" dirty="0" smtClean="0"/>
-              <a:t>and being able to communicate to others.</a:t>
+              <a:t>Knowing your scope of work and being able to communicate to others.</a:t>
             </a:r>
           </a:p>
           <a:p>
@@ -4047,7 +4276,7 @@
           <a:p>
             <a:r>
               <a:rPr lang="en-US" dirty="0" smtClean="0"/>
-              <a:t>Application’s Concept</a:t>
+              <a:t>Overview</a:t>
             </a:r>
             <a:endParaRPr lang="en-US" dirty="0"/>
           </a:p>
@@ -4065,60 +4294,63 @@
         </p:nvSpPr>
         <p:spPr/>
         <p:txBody>
-          <a:bodyPr/>
+          <a:bodyPr>
+            <a:normAutofit fontScale="92500" lnSpcReduction="10000"/>
+          </a:bodyPr>
           <a:lstStyle/>
           <a:p>
             <a:r>
-              <a:rPr lang="en-US" dirty="0" err="1"/>
-              <a:t>codeDeck</a:t>
-            </a:r>
-            <a:r>
-              <a:rPr lang="en-US" dirty="0"/>
-              <a:t> is a virtual flash card application which features a deck of flash cards displayed in random order. Cards are displayed to the user one by one as the user clicks through them to review the topic of the deck</a:t>
-            </a:r>
-            <a:r>
-              <a:rPr lang="en-US" dirty="0" smtClean="0"/>
-              <a:t>.</a:t>
-            </a:r>
-          </a:p>
-          <a:p>
-            <a:r>
-              <a:rPr lang="en-US" dirty="0" smtClean="0"/>
-              <a:t>Additional resource to </a:t>
-            </a:r>
-            <a:r>
-              <a:rPr lang="en-US" dirty="0"/>
-              <a:t>complement </a:t>
-            </a:r>
-            <a:r>
-              <a:rPr lang="en-US" dirty="0" smtClean="0"/>
-              <a:t>your learning.</a:t>
-            </a:r>
-            <a:endParaRPr lang="en-US" dirty="0"/>
-          </a:p>
-          <a:p>
-            <a:r>
-              <a:rPr lang="en-US" dirty="0"/>
-              <a:t>In addition to the flash cards, the user can access </a:t>
-            </a:r>
-            <a:r>
-              <a:rPr lang="en-US" dirty="0" smtClean="0"/>
-              <a:t>the hint and/or further information through a </a:t>
-            </a:r>
-            <a:r>
-              <a:rPr lang="en-US" dirty="0"/>
-              <a:t>provider </a:t>
-            </a:r>
-            <a:r>
-              <a:rPr lang="en-US" dirty="0" smtClean="0"/>
-              <a:t>to enhance </a:t>
-            </a:r>
-            <a:r>
-              <a:rPr lang="en-US" dirty="0"/>
-              <a:t>the study experience.</a:t>
-            </a:r>
-          </a:p>
-          <a:p>
+              <a:rPr lang="en-US" dirty="0" smtClean="0"/>
+              <a:t>Application’s Concepts</a:t>
+            </a:r>
+          </a:p>
+          <a:p>
+            <a:r>
+              <a:rPr lang="en-US" dirty="0" smtClean="0"/>
+              <a:t>Motivation for its Development</a:t>
+            </a:r>
+          </a:p>
+          <a:p>
+            <a:r>
+              <a:rPr lang="en-US" dirty="0" smtClean="0"/>
+              <a:t>Design Process</a:t>
+            </a:r>
+          </a:p>
+          <a:p>
+            <a:r>
+              <a:rPr lang="en-US" dirty="0" smtClean="0"/>
+              <a:t>Technologies</a:t>
+            </a:r>
+          </a:p>
+          <a:p>
+            <a:r>
+              <a:rPr lang="en-US" dirty="0" smtClean="0"/>
+              <a:t>Demo</a:t>
+            </a:r>
+          </a:p>
+          <a:p>
+            <a:r>
+              <a:rPr lang="en-US" dirty="0" smtClean="0"/>
+              <a:t>Future Development</a:t>
+            </a:r>
+          </a:p>
+          <a:p>
+            <a:r>
+              <a:rPr lang="en-US" dirty="0" smtClean="0"/>
+              <a:t>Marketing Plan</a:t>
+            </a:r>
+          </a:p>
+          <a:p>
+            <a:r>
+              <a:rPr lang="en-US" dirty="0" smtClean="0"/>
+              <a:t>Cost</a:t>
+            </a:r>
+          </a:p>
+          <a:p>
+            <a:r>
+              <a:rPr lang="en-US" dirty="0" smtClean="0"/>
+              <a:t>Group Milestones</a:t>
+            </a:r>
             <a:endParaRPr lang="en-US" dirty="0"/>
           </a:p>
         </p:txBody>
@@ -4126,20 +4358,13 @@
     </p:spTree>
     <p:extLst>
       <p:ext uri="{BB962C8B-B14F-4D97-AF65-F5344CB8AC3E}">
-        <p14:creationId xmlns:p14="http://schemas.microsoft.com/office/powerpoint/2010/main" val="1594798827"/>
+        <p14:creationId xmlns:p14="http://schemas.microsoft.com/office/powerpoint/2010/main" val="2016633862"/>
       </p:ext>
     </p:extLst>
   </p:cSld>
   <p:clrMapOvr>
     <a:masterClrMapping/>
   </p:clrMapOvr>
-  <p:timing>
-    <p:tnLst>
-      <p:par>
-        <p:cTn id="1" dur="indefinite" restart="never" nodeType="tmRoot"/>
-      </p:par>
-    </p:tnLst>
-  </p:timing>
 </p:sld>
 </file>
 
@@ -4177,65 +4402,82 @@
           <a:p>
             <a:r>
               <a:rPr lang="en-US" dirty="0" smtClean="0"/>
-              <a:t>Motivation </a:t>
+              <a:t>Application’s </a:t>
+            </a:r>
+            <a:r>
+              <a:rPr lang="en-US" dirty="0" smtClean="0"/>
+              <a:t>Concepts</a:t>
+            </a:r>
+            <a:endParaRPr lang="en-US" dirty="0"/>
+          </a:p>
+        </p:txBody>
+      </p:sp>
+      <p:sp>
+        <p:nvSpPr>
+          <p:cNvPr id="3" name="Content Placeholder 2"/>
+          <p:cNvSpPr>
+            <a:spLocks noGrp="1"/>
+          </p:cNvSpPr>
+          <p:nvPr>
+            <p:ph idx="1"/>
+          </p:nvPr>
+        </p:nvSpPr>
+        <p:spPr/>
+        <p:txBody>
+          <a:bodyPr/>
+          <a:lstStyle/>
+          <a:p>
+            <a:r>
+              <a:rPr lang="en-US" dirty="0" err="1"/>
+              <a:t>codeDeck</a:t>
             </a:r>
             <a:r>
               <a:rPr lang="en-US" dirty="0"/>
-              <a:t>for its </a:t>
-            </a:r>
-            <a:r>
-              <a:rPr lang="en-US" dirty="0" smtClean="0"/>
-              <a:t>Development</a:t>
-            </a:r>
-            <a:endParaRPr lang="en-US" dirty="0"/>
-          </a:p>
-        </p:txBody>
-      </p:sp>
-      <p:sp>
-        <p:nvSpPr>
-          <p:cNvPr id="3" name="Content Placeholder 2"/>
-          <p:cNvSpPr>
-            <a:spLocks noGrp="1"/>
-          </p:cNvSpPr>
-          <p:nvPr>
-            <p:ph idx="1"/>
-          </p:nvPr>
-        </p:nvSpPr>
-        <p:spPr/>
-        <p:txBody>
-          <a:bodyPr/>
-          <a:lstStyle/>
-          <a:p>
-            <a:r>
-              <a:rPr lang="en-US" dirty="0" smtClean="0"/>
-              <a:t>To create a helpful, engaging, and interactive application that could be used to help reinforce coding concepts.  </a:t>
-            </a:r>
-          </a:p>
-          <a:p>
-            <a:r>
-              <a:rPr lang="en-US" dirty="0" smtClean="0"/>
-              <a:t>To assist anyone in self-learning environment, fast-paced training, </a:t>
-            </a:r>
-            <a:r>
-              <a:rPr lang="en-US" dirty="0" err="1" smtClean="0"/>
-              <a:t>bootcamps</a:t>
-            </a:r>
-            <a:r>
-              <a:rPr lang="en-US" dirty="0" smtClean="0"/>
-              <a:t>, etc.</a:t>
-            </a:r>
-          </a:p>
-          <a:p>
-            <a:r>
-              <a:rPr lang="en-US" dirty="0" smtClean="0"/>
-              <a:t>To foster engagement and creativity in children and adults.</a:t>
-            </a:r>
-          </a:p>
-          <a:p>
-            <a:r>
-              <a:rPr lang="en-US" dirty="0" smtClean="0"/>
-              <a:t>Application that is open source and is made available to anyone interested in coding.</a:t>
-            </a:r>
+              <a:t> is a virtual flash card application which features a deck of flash cards displayed in random order. Cards are displayed to the user one by one as the user clicks through them to review the topic of the deck</a:t>
+            </a:r>
+            <a:r>
+              <a:rPr lang="en-US" dirty="0" smtClean="0"/>
+              <a:t>.</a:t>
+            </a:r>
+          </a:p>
+          <a:p>
+            <a:r>
+              <a:rPr lang="en-US" dirty="0" smtClean="0"/>
+              <a:t>Additional resource to </a:t>
+            </a:r>
+            <a:r>
+              <a:rPr lang="en-US" dirty="0"/>
+              <a:t>complement </a:t>
+            </a:r>
+            <a:r>
+              <a:rPr lang="en-US" dirty="0" smtClean="0"/>
+              <a:t>your learning.</a:t>
+            </a:r>
+            <a:endParaRPr lang="en-US" dirty="0"/>
+          </a:p>
+          <a:p>
+            <a:r>
+              <a:rPr lang="en-US" dirty="0"/>
+              <a:t>In addition to the flash cards, the user can access </a:t>
+            </a:r>
+            <a:r>
+              <a:rPr lang="en-US" dirty="0" smtClean="0"/>
+              <a:t>the hint and/or further information through a </a:t>
+            </a:r>
+            <a:r>
+              <a:rPr lang="en-US" dirty="0"/>
+              <a:t>provider </a:t>
+            </a:r>
+            <a:r>
+              <a:rPr lang="en-US" dirty="0" smtClean="0"/>
+              <a:t>to enhance </a:t>
+            </a:r>
+            <a:r>
+              <a:rPr lang="en-US" dirty="0"/>
+              <a:t>the study experience.</a:t>
+            </a:r>
+          </a:p>
+          <a:p>
             <a:endParaRPr lang="en-US" dirty="0"/>
           </a:p>
         </p:txBody>
@@ -4243,7 +4485,7 @@
     </p:spTree>
     <p:extLst>
       <p:ext uri="{BB962C8B-B14F-4D97-AF65-F5344CB8AC3E}">
-        <p14:creationId xmlns:p14="http://schemas.microsoft.com/office/powerpoint/2010/main" val="587479645"/>
+        <p14:creationId xmlns:p14="http://schemas.microsoft.com/office/powerpoint/2010/main" val="1594798827"/>
       </p:ext>
     </p:extLst>
   </p:cSld>
@@ -4294,7 +4536,15 @@
           <a:p>
             <a:r>
               <a:rPr lang="en-US" dirty="0" smtClean="0"/>
-              <a:t>Design Process</a:t>
+              <a:t>Motivation </a:t>
+            </a:r>
+            <a:r>
+              <a:rPr lang="en-US" dirty="0"/>
+              <a:t>for its </a:t>
+            </a:r>
+            <a:r>
+              <a:rPr lang="en-US" dirty="0" smtClean="0"/>
+              <a:t>Development</a:t>
             </a:r>
             <a:endParaRPr lang="en-US" dirty="0"/>
           </a:p>
@@ -4310,412 +4560,49 @@
             <p:ph idx="1"/>
           </p:nvPr>
         </p:nvSpPr>
-        <p:spPr>
-          <a:xfrm>
-            <a:off x="1371599" y="1586753"/>
-            <a:ext cx="4976949" cy="5138137"/>
-          </a:xfrm>
-        </p:spPr>
-        <p:txBody>
-          <a:bodyPr>
-            <a:normAutofit fontScale="85000" lnSpcReduction="20000"/>
-          </a:bodyPr>
+        <p:spPr/>
+        <p:txBody>
+          <a:bodyPr/>
           <a:lstStyle/>
           <a:p>
             <a:r>
               <a:rPr lang="en-US" dirty="0" smtClean="0"/>
-              <a:t> Proposal</a:t>
-            </a:r>
-          </a:p>
-          <a:p>
-            <a:pPr lvl="1"/>
-            <a:r>
-              <a:rPr lang="en-US" dirty="0" smtClean="0"/>
-              <a:t>Brainstorming Ideas</a:t>
-            </a:r>
-          </a:p>
-          <a:p>
-            <a:pPr lvl="1"/>
-            <a:r>
-              <a:rPr lang="en-US" dirty="0" smtClean="0"/>
-              <a:t>Determine Audience</a:t>
-            </a:r>
-          </a:p>
-          <a:p>
-            <a:pPr lvl="1"/>
-            <a:r>
-              <a:rPr lang="en-US" dirty="0" smtClean="0"/>
-              <a:t>Narrow Scope</a:t>
-            </a:r>
-          </a:p>
-          <a:p>
-            <a:pPr lvl="1"/>
-            <a:r>
-              <a:rPr lang="en-US" dirty="0" smtClean="0"/>
-              <a:t>Discussion of Options of APIs</a:t>
-            </a:r>
-          </a:p>
-          <a:p>
-            <a:pPr lvl="1"/>
-            <a:r>
-              <a:rPr lang="en-US" dirty="0" smtClean="0"/>
-              <a:t>Comparisons of Current Competitors (</a:t>
+              <a:t>To create a helpful, engaging, and interactive application that could be used to help reinforce coding concepts.  </a:t>
+            </a:r>
+          </a:p>
+          <a:p>
+            <a:r>
+              <a:rPr lang="en-US" dirty="0" smtClean="0"/>
+              <a:t>To assist anyone in self-learning environment, fast-paced training, </a:t>
             </a:r>
             <a:r>
               <a:rPr lang="en-US" dirty="0" err="1" smtClean="0"/>
-              <a:t>codecards</a:t>
-            </a:r>
-            <a:r>
-              <a:rPr lang="en-US" dirty="0" smtClean="0"/>
-              <a:t>, </a:t>
-            </a:r>
-            <a:r>
-              <a:rPr lang="en-US" dirty="0" err="1" smtClean="0"/>
-              <a:t>Quizlets</a:t>
-            </a:r>
-            <a:r>
-              <a:rPr lang="en-US" dirty="0" smtClean="0"/>
-              <a:t>)</a:t>
-            </a:r>
-          </a:p>
-          <a:p>
-            <a:r>
-              <a:rPr lang="en-US" dirty="0" smtClean="0"/>
-              <a:t>Development</a:t>
-            </a:r>
-          </a:p>
-          <a:p>
-            <a:pPr lvl="1"/>
-            <a:r>
-              <a:rPr lang="en-US" dirty="0" smtClean="0"/>
-              <a:t>Daily Standups/Sprint Planning Meetings</a:t>
-            </a:r>
-            <a:endParaRPr lang="en-US" dirty="0" smtClean="0"/>
-          </a:p>
-          <a:p>
-            <a:pPr lvl="1"/>
-            <a:r>
-              <a:rPr lang="en-US" dirty="0" smtClean="0"/>
-              <a:t>Create Wireframe, HTML, and CSS</a:t>
-            </a:r>
-          </a:p>
-          <a:p>
-            <a:pPr lvl="1"/>
-            <a:r>
-              <a:rPr lang="en-US" dirty="0" smtClean="0"/>
-              <a:t>Research APIs/Implementation</a:t>
-            </a:r>
-          </a:p>
-          <a:p>
-            <a:pPr lvl="1"/>
-            <a:r>
-              <a:rPr lang="en-US" dirty="0" smtClean="0"/>
-              <a:t>Pseudocode and Write JavaScript</a:t>
-            </a:r>
-          </a:p>
-          <a:p>
-            <a:pPr lvl="1"/>
-            <a:r>
-              <a:rPr lang="en-US" dirty="0" smtClean="0"/>
-              <a:t>Database Design</a:t>
-            </a:r>
-          </a:p>
-          <a:p>
-            <a:pPr lvl="1"/>
-            <a:r>
-              <a:rPr lang="en-US" dirty="0" smtClean="0"/>
-              <a:t>Connecting HTML and JavaScript</a:t>
-            </a:r>
-          </a:p>
-          <a:p>
-            <a:pPr lvl="1"/>
-            <a:r>
-              <a:rPr lang="en-US" dirty="0" smtClean="0"/>
-              <a:t>Debugging</a:t>
-            </a:r>
-          </a:p>
-          <a:p>
-            <a:pPr lvl="1"/>
-            <a:r>
-              <a:rPr lang="en-US" dirty="0" smtClean="0"/>
-              <a:t>Add/Discussion of New Features</a:t>
-            </a:r>
-          </a:p>
-          <a:p>
-            <a:pPr lvl="1"/>
-            <a:r>
-              <a:rPr lang="en-US" dirty="0" smtClean="0"/>
-              <a:t>Marketing Plan</a:t>
-            </a:r>
-            <a:endParaRPr lang="en-US" dirty="0"/>
-          </a:p>
-        </p:txBody>
-      </p:sp>
-      <p:sp>
-        <p:nvSpPr>
-          <p:cNvPr id="4" name="Content Placeholder 2"/>
-          <p:cNvSpPr txBox="1">
-            <a:spLocks/>
-          </p:cNvSpPr>
-          <p:nvPr/>
-        </p:nvSpPr>
-        <p:spPr>
-          <a:xfrm>
-            <a:off x="6642847" y="1566775"/>
-            <a:ext cx="4329953" cy="5138137"/>
-          </a:xfrm>
-          <a:prstGeom prst="rect">
-            <a:avLst/>
-          </a:prstGeom>
-        </p:spPr>
-        <p:txBody>
-          <a:bodyPr vert="horz" lIns="91440" tIns="45720" rIns="91440" bIns="45720" rtlCol="0">
-            <a:normAutofit/>
-          </a:bodyPr>
-          <a:lstStyle>
-            <a:lvl1pPr marL="384048" indent="-384048" algn="l" defTabSz="914400" rtl="0" eaLnBrk="1" latinLnBrk="0" hangingPunct="1">
-              <a:lnSpc>
-                <a:spcPct val="94000"/>
-              </a:lnSpc>
-              <a:spcBef>
-                <a:spcPts val="1000"/>
-              </a:spcBef>
-              <a:spcAft>
-                <a:spcPts val="200"/>
-              </a:spcAft>
-              <a:buFont typeface="Franklin Gothic Book" panose="020B0503020102020204" pitchFamily="34" charset="0"/>
-              <a:buChar char="■"/>
-              <a:defRPr sz="2000" kern="1200" baseline="0">
-                <a:solidFill>
-                  <a:schemeClr val="tx2"/>
-                </a:solidFill>
-                <a:latin typeface="+mn-lt"/>
-                <a:ea typeface="+mn-ea"/>
-                <a:cs typeface="+mn-cs"/>
-              </a:defRPr>
-            </a:lvl1pPr>
-            <a:lvl2pPr marL="914400" indent="-384048" algn="l" defTabSz="914400" rtl="0" eaLnBrk="1" latinLnBrk="0" hangingPunct="1">
-              <a:lnSpc>
-                <a:spcPct val="94000"/>
-              </a:lnSpc>
-              <a:spcBef>
-                <a:spcPts val="500"/>
-              </a:spcBef>
-              <a:spcAft>
-                <a:spcPts val="200"/>
-              </a:spcAft>
-              <a:buFont typeface="Franklin Gothic Book" panose="020B0503020102020204" pitchFamily="34" charset="0"/>
-              <a:buChar char="–"/>
-              <a:defRPr sz="2000" i="1" kern="1200" baseline="0">
-                <a:solidFill>
-                  <a:schemeClr val="tx2"/>
-                </a:solidFill>
-                <a:latin typeface="+mn-lt"/>
-                <a:ea typeface="+mn-ea"/>
-                <a:cs typeface="+mn-cs"/>
-              </a:defRPr>
-            </a:lvl2pPr>
-            <a:lvl3pPr marL="1371600" indent="-384048" algn="l" defTabSz="914400" rtl="0" eaLnBrk="1" latinLnBrk="0" hangingPunct="1">
-              <a:lnSpc>
-                <a:spcPct val="94000"/>
-              </a:lnSpc>
-              <a:spcBef>
-                <a:spcPts val="500"/>
-              </a:spcBef>
-              <a:spcAft>
-                <a:spcPts val="200"/>
-              </a:spcAft>
-              <a:buFont typeface="Franklin Gothic Book" panose="020B0503020102020204" pitchFamily="34" charset="0"/>
-              <a:buChar char="■"/>
-              <a:defRPr sz="1800" kern="1200" baseline="0">
-                <a:solidFill>
-                  <a:schemeClr val="tx2"/>
-                </a:solidFill>
-                <a:latin typeface="+mn-lt"/>
-                <a:ea typeface="+mn-ea"/>
-                <a:cs typeface="+mn-cs"/>
-              </a:defRPr>
-            </a:lvl3pPr>
-            <a:lvl4pPr marL="1828800" indent="-384048" algn="l" defTabSz="914400" rtl="0" eaLnBrk="1" latinLnBrk="0" hangingPunct="1">
-              <a:lnSpc>
-                <a:spcPct val="94000"/>
-              </a:lnSpc>
-              <a:spcBef>
-                <a:spcPts val="500"/>
-              </a:spcBef>
-              <a:spcAft>
-                <a:spcPts val="200"/>
-              </a:spcAft>
-              <a:buFont typeface="Franklin Gothic Book" panose="020B0503020102020204" pitchFamily="34" charset="0"/>
-              <a:buChar char="–"/>
-              <a:defRPr sz="1800" i="1" kern="1200" baseline="0">
-                <a:solidFill>
-                  <a:schemeClr val="tx2"/>
-                </a:solidFill>
-                <a:latin typeface="+mn-lt"/>
-                <a:ea typeface="+mn-ea"/>
-                <a:cs typeface="+mn-cs"/>
-              </a:defRPr>
-            </a:lvl4pPr>
-            <a:lvl5pPr marL="2286000" indent="-384048" algn="l" defTabSz="914400" rtl="0" eaLnBrk="1" latinLnBrk="0" hangingPunct="1">
-              <a:lnSpc>
-                <a:spcPct val="94000"/>
-              </a:lnSpc>
-              <a:spcBef>
-                <a:spcPts val="500"/>
-              </a:spcBef>
-              <a:spcAft>
-                <a:spcPts val="200"/>
-              </a:spcAft>
-              <a:buFont typeface="Franklin Gothic Book" panose="020B0503020102020204" pitchFamily="34" charset="0"/>
-              <a:buChar char="■"/>
-              <a:defRPr sz="1600" kern="1200" baseline="0">
-                <a:solidFill>
-                  <a:schemeClr val="tx2"/>
-                </a:solidFill>
-                <a:latin typeface="+mn-lt"/>
-                <a:ea typeface="+mn-ea"/>
-                <a:cs typeface="+mn-cs"/>
-              </a:defRPr>
-            </a:lvl5pPr>
-            <a:lvl6pPr marL="2743200" indent="-384048" algn="l" defTabSz="914400" rtl="0" eaLnBrk="1" latinLnBrk="0" hangingPunct="1">
-              <a:lnSpc>
-                <a:spcPct val="94000"/>
-              </a:lnSpc>
-              <a:spcBef>
-                <a:spcPts val="500"/>
-              </a:spcBef>
-              <a:spcAft>
-                <a:spcPts val="200"/>
-              </a:spcAft>
-              <a:buFont typeface="Franklin Gothic Book" panose="020B0503020102020204" pitchFamily="34" charset="0"/>
-              <a:buChar char="–"/>
-              <a:defRPr sz="1600" i="1" kern="1200" baseline="0">
-                <a:solidFill>
-                  <a:schemeClr val="tx2"/>
-                </a:solidFill>
-                <a:latin typeface="+mn-lt"/>
-                <a:ea typeface="+mn-ea"/>
-                <a:cs typeface="+mn-cs"/>
-              </a:defRPr>
-            </a:lvl6pPr>
-            <a:lvl7pPr marL="3200400" indent="-384048" algn="l" defTabSz="914400" rtl="0" eaLnBrk="1" latinLnBrk="0" hangingPunct="1">
-              <a:lnSpc>
-                <a:spcPct val="94000"/>
-              </a:lnSpc>
-              <a:spcBef>
-                <a:spcPts val="500"/>
-              </a:spcBef>
-              <a:spcAft>
-                <a:spcPts val="200"/>
-              </a:spcAft>
-              <a:buFont typeface="Franklin Gothic Book" panose="020B0503020102020204" pitchFamily="34" charset="0"/>
-              <a:buChar char="■"/>
-              <a:defRPr sz="1400" kern="1200" baseline="0">
-                <a:solidFill>
-                  <a:schemeClr val="tx2"/>
-                </a:solidFill>
-                <a:latin typeface="+mn-lt"/>
-                <a:ea typeface="+mn-ea"/>
-                <a:cs typeface="+mn-cs"/>
-              </a:defRPr>
-            </a:lvl7pPr>
-            <a:lvl8pPr marL="3657600" indent="-384048" algn="l" defTabSz="914400" rtl="0" eaLnBrk="1" latinLnBrk="0" hangingPunct="1">
-              <a:lnSpc>
-                <a:spcPct val="94000"/>
-              </a:lnSpc>
-              <a:spcBef>
-                <a:spcPts val="500"/>
-              </a:spcBef>
-              <a:spcAft>
-                <a:spcPts val="200"/>
-              </a:spcAft>
-              <a:buFont typeface="Franklin Gothic Book" panose="020B0503020102020204" pitchFamily="34" charset="0"/>
-              <a:buChar char="–"/>
-              <a:defRPr sz="1400" i="1" kern="1200" baseline="0">
-                <a:solidFill>
-                  <a:schemeClr val="tx2"/>
-                </a:solidFill>
-                <a:latin typeface="+mn-lt"/>
-                <a:ea typeface="+mn-ea"/>
-                <a:cs typeface="+mn-cs"/>
-              </a:defRPr>
-            </a:lvl8pPr>
-            <a:lvl9pPr marL="4114800" indent="-384048" algn="l" defTabSz="914400" rtl="0" eaLnBrk="1" latinLnBrk="0" hangingPunct="1">
-              <a:lnSpc>
-                <a:spcPct val="94000"/>
-              </a:lnSpc>
-              <a:spcBef>
-                <a:spcPts val="500"/>
-              </a:spcBef>
-              <a:spcAft>
-                <a:spcPts val="200"/>
-              </a:spcAft>
-              <a:buFont typeface="Franklin Gothic Book" panose="020B0503020102020204" pitchFamily="34" charset="0"/>
-              <a:buChar char="■"/>
-              <a:defRPr sz="1400" kern="1200" baseline="0">
-                <a:solidFill>
-                  <a:schemeClr val="tx2"/>
-                </a:solidFill>
-                <a:latin typeface="+mn-lt"/>
-                <a:ea typeface="+mn-ea"/>
-                <a:cs typeface="+mn-cs"/>
-              </a:defRPr>
-            </a:lvl9pPr>
-          </a:lstStyle>
-          <a:p>
-            <a:r>
-              <a:rPr lang="en-US" dirty="0" smtClean="0"/>
-              <a:t>Deployment</a:t>
-            </a:r>
-            <a:endParaRPr lang="en-US" dirty="0" smtClean="0"/>
-          </a:p>
-          <a:p>
-            <a:pPr lvl="1"/>
-            <a:r>
-              <a:rPr lang="en-US" dirty="0" smtClean="0"/>
-              <a:t>Prototype </a:t>
-            </a:r>
-            <a:r>
-              <a:rPr lang="mr-IN" dirty="0" smtClean="0"/>
-              <a:t>–</a:t>
-            </a:r>
-            <a:r>
-              <a:rPr lang="en-US" dirty="0" smtClean="0"/>
-              <a:t> Beta Testing</a:t>
-            </a:r>
-            <a:endParaRPr lang="en-US" dirty="0"/>
-          </a:p>
-          <a:p>
-            <a:pPr lvl="1"/>
-            <a:r>
-              <a:rPr lang="en-US" dirty="0"/>
-              <a:t>RCT (Rapid Cycle Testing)</a:t>
-            </a:r>
-          </a:p>
-          <a:p>
-            <a:r>
-              <a:rPr lang="en-US" dirty="0" smtClean="0"/>
-              <a:t>Release</a:t>
-            </a:r>
-          </a:p>
-          <a:p>
-            <a:pPr lvl="1"/>
-            <a:r>
-              <a:rPr lang="en-US" dirty="0" smtClean="0"/>
-              <a:t>Making it available to everyone</a:t>
-            </a:r>
-            <a:endParaRPr lang="en-US" dirty="0"/>
-          </a:p>
-          <a:p>
-            <a:endParaRPr lang="en-US" dirty="0" smtClean="0"/>
+              <a:t>bootcamps</a:t>
+            </a:r>
+            <a:r>
+              <a:rPr lang="en-US" dirty="0" smtClean="0"/>
+              <a:t>, etc.</a:t>
+            </a:r>
+          </a:p>
+          <a:p>
+            <a:r>
+              <a:rPr lang="en-US" dirty="0" smtClean="0"/>
+              <a:t>To foster engagement and creativity in children and adults.</a:t>
+            </a:r>
+          </a:p>
+          <a:p>
+            <a:r>
+              <a:rPr lang="en-US" dirty="0" smtClean="0"/>
+              <a:t>Application that is open source and is made available to anyone interested in coding.</a:t>
+            </a:r>
+            <a:endParaRPr lang="en-US" dirty="0"/>
           </a:p>
         </p:txBody>
       </p:sp>
     </p:spTree>
     <p:extLst>
       <p:ext uri="{BB962C8B-B14F-4D97-AF65-F5344CB8AC3E}">
-        <p14:creationId xmlns:p14="http://schemas.microsoft.com/office/powerpoint/2010/main" val="1788068256"/>
+        <p14:creationId xmlns:p14="http://schemas.microsoft.com/office/powerpoint/2010/main" val="587479645"/>
       </p:ext>
     </p:extLst>
   </p:cSld>
@@ -4765,25 +4652,10 @@
           <a:lstStyle/>
           <a:p>
             <a:r>
-              <a:rPr lang="en-US" dirty="0"/>
-              <a:t>T</a:t>
-            </a:r>
-            <a:r>
-              <a:rPr lang="en-US" dirty="0" smtClean="0"/>
-              <a:t>echnologies Used </a:t>
-            </a:r>
-            <a:r>
-              <a:rPr lang="en-US" dirty="0"/>
-              <a:t>(and </a:t>
-            </a:r>
-            <a:r>
-              <a:rPr lang="en-US" dirty="0" smtClean="0"/>
-              <a:t>how </a:t>
-            </a:r>
-            <a:r>
-              <a:rPr lang="en-US" dirty="0"/>
-              <a:t>they work)</a:t>
-            </a:r>
+              <a:rPr lang="en-US" dirty="0" smtClean="0"/>
+              <a:t>Design Process</a:t>
+            </a:r>
+            <a:endParaRPr lang="en-US" dirty="0"/>
           </a:p>
         </p:txBody>
       </p:sp>
@@ -4797,16 +4669,371 @@
             <p:ph idx="1"/>
           </p:nvPr>
         </p:nvSpPr>
-        <p:spPr/>
+        <p:spPr>
+          <a:xfrm>
+            <a:off x="1371599" y="1586753"/>
+            <a:ext cx="4976949" cy="5138137"/>
+          </a:xfrm>
+        </p:spPr>
         <p:txBody>
           <a:bodyPr>
-            <a:normAutofit fontScale="70000" lnSpcReduction="20000"/>
+            <a:normAutofit fontScale="85000" lnSpcReduction="20000"/>
           </a:bodyPr>
           <a:lstStyle/>
           <a:p>
             <a:r>
               <a:rPr lang="en-US" dirty="0" smtClean="0"/>
-              <a:t>Wikipedia API </a:t>
+              <a:t> Proposal</a:t>
+            </a:r>
+          </a:p>
+          <a:p>
+            <a:pPr lvl="1"/>
+            <a:r>
+              <a:rPr lang="en-US" dirty="0" smtClean="0"/>
+              <a:t>Brainstorming Ideas</a:t>
+            </a:r>
+          </a:p>
+          <a:p>
+            <a:pPr lvl="1"/>
+            <a:r>
+              <a:rPr lang="en-US" dirty="0" smtClean="0"/>
+              <a:t>Determine Audience</a:t>
+            </a:r>
+          </a:p>
+          <a:p>
+            <a:pPr lvl="1"/>
+            <a:r>
+              <a:rPr lang="en-US" dirty="0" smtClean="0"/>
+              <a:t>Narrow Scope</a:t>
+            </a:r>
+          </a:p>
+          <a:p>
+            <a:pPr lvl="1"/>
+            <a:r>
+              <a:rPr lang="en-US" dirty="0" smtClean="0"/>
+              <a:t>Discussion of Options of APIs</a:t>
+            </a:r>
+          </a:p>
+          <a:p>
+            <a:pPr lvl="1"/>
+            <a:r>
+              <a:rPr lang="en-US" dirty="0" smtClean="0"/>
+              <a:t>Comparisons of Current Competitors (</a:t>
+            </a:r>
+            <a:r>
+              <a:rPr lang="en-US" dirty="0" err="1" smtClean="0"/>
+              <a:t>codecards</a:t>
+            </a:r>
+            <a:r>
+              <a:rPr lang="en-US" dirty="0" smtClean="0"/>
+              <a:t>, </a:t>
+            </a:r>
+            <a:r>
+              <a:rPr lang="en-US" dirty="0" err="1" smtClean="0"/>
+              <a:t>Quizlets</a:t>
+            </a:r>
+            <a:r>
+              <a:rPr lang="en-US" dirty="0" smtClean="0"/>
+              <a:t>)</a:t>
+            </a:r>
+          </a:p>
+          <a:p>
+            <a:r>
+              <a:rPr lang="en-US" dirty="0" smtClean="0"/>
+              <a:t>Development</a:t>
+            </a:r>
+          </a:p>
+          <a:p>
+            <a:pPr lvl="1"/>
+            <a:r>
+              <a:rPr lang="en-US" dirty="0" smtClean="0"/>
+              <a:t>Daily Standups/Sprint Planning Meetings</a:t>
+            </a:r>
+            <a:endParaRPr lang="en-US" dirty="0" smtClean="0"/>
+          </a:p>
+          <a:p>
+            <a:pPr lvl="1"/>
+            <a:r>
+              <a:rPr lang="en-US" dirty="0" smtClean="0"/>
+              <a:t>Create Wireframe, HTML, and CSS</a:t>
+            </a:r>
+          </a:p>
+          <a:p>
+            <a:pPr lvl="1"/>
+            <a:r>
+              <a:rPr lang="en-US" dirty="0" smtClean="0"/>
+              <a:t>Research APIs/Implementation</a:t>
+            </a:r>
+          </a:p>
+          <a:p>
+            <a:pPr lvl="1"/>
+            <a:r>
+              <a:rPr lang="en-US" dirty="0" smtClean="0"/>
+              <a:t>Pseudocode and Write JavaScript</a:t>
+            </a:r>
+          </a:p>
+          <a:p>
+            <a:pPr lvl="1"/>
+            <a:r>
+              <a:rPr lang="en-US" dirty="0" smtClean="0"/>
+              <a:t>Database Design</a:t>
+            </a:r>
+          </a:p>
+          <a:p>
+            <a:pPr lvl="1"/>
+            <a:r>
+              <a:rPr lang="en-US" dirty="0" smtClean="0"/>
+              <a:t>Connecting HTML and JavaScript</a:t>
+            </a:r>
+          </a:p>
+          <a:p>
+            <a:pPr lvl="1"/>
+            <a:r>
+              <a:rPr lang="en-US" dirty="0" smtClean="0"/>
+              <a:t>Debugging</a:t>
+            </a:r>
+          </a:p>
+          <a:p>
+            <a:pPr lvl="1"/>
+            <a:r>
+              <a:rPr lang="en-US" dirty="0" smtClean="0"/>
+              <a:t>Add/Discussion of New Features</a:t>
+            </a:r>
+          </a:p>
+          <a:p>
+            <a:pPr lvl="1"/>
+            <a:r>
+              <a:rPr lang="en-US" dirty="0" smtClean="0"/>
+              <a:t>Marketing Plan</a:t>
+            </a:r>
+            <a:endParaRPr lang="en-US" dirty="0"/>
+          </a:p>
+        </p:txBody>
+      </p:sp>
+      <p:sp>
+        <p:nvSpPr>
+          <p:cNvPr id="4" name="Content Placeholder 2"/>
+          <p:cNvSpPr txBox="1">
+            <a:spLocks/>
+          </p:cNvSpPr>
+          <p:nvPr/>
+        </p:nvSpPr>
+        <p:spPr>
+          <a:xfrm>
+            <a:off x="6642847" y="1566775"/>
+            <a:ext cx="4329953" cy="5138137"/>
+          </a:xfrm>
+          <a:prstGeom prst="rect">
+            <a:avLst/>
+          </a:prstGeom>
+        </p:spPr>
+        <p:txBody>
+          <a:bodyPr vert="horz" lIns="91440" tIns="45720" rIns="91440" bIns="45720" rtlCol="0">
+            <a:normAutofit/>
+          </a:bodyPr>
+          <a:lstStyle>
+            <a:lvl1pPr marL="384048" indent="-384048" algn="l" defTabSz="914400" rtl="0" eaLnBrk="1" latinLnBrk="0" hangingPunct="1">
+              <a:lnSpc>
+                <a:spcPct val="94000"/>
+              </a:lnSpc>
+              <a:spcBef>
+                <a:spcPts val="1000"/>
+              </a:spcBef>
+              <a:spcAft>
+                <a:spcPts val="200"/>
+              </a:spcAft>
+              <a:buFont typeface="Franklin Gothic Book" panose="020B0503020102020204" pitchFamily="34" charset="0"/>
+              <a:buChar char="■"/>
+              <a:defRPr sz="2000" kern="1200" baseline="0">
+                <a:solidFill>
+                  <a:schemeClr val="tx2"/>
+                </a:solidFill>
+                <a:latin typeface="+mn-lt"/>
+                <a:ea typeface="+mn-ea"/>
+                <a:cs typeface="+mn-cs"/>
+              </a:defRPr>
+            </a:lvl1pPr>
+            <a:lvl2pPr marL="914400" indent="-384048" algn="l" defTabSz="914400" rtl="0" eaLnBrk="1" latinLnBrk="0" hangingPunct="1">
+              <a:lnSpc>
+                <a:spcPct val="94000"/>
+              </a:lnSpc>
+              <a:spcBef>
+                <a:spcPts val="500"/>
+              </a:spcBef>
+              <a:spcAft>
+                <a:spcPts val="200"/>
+              </a:spcAft>
+              <a:buFont typeface="Franklin Gothic Book" panose="020B0503020102020204" pitchFamily="34" charset="0"/>
+              <a:buChar char="–"/>
+              <a:defRPr sz="2000" i="1" kern="1200" baseline="0">
+                <a:solidFill>
+                  <a:schemeClr val="tx2"/>
+                </a:solidFill>
+                <a:latin typeface="+mn-lt"/>
+                <a:ea typeface="+mn-ea"/>
+                <a:cs typeface="+mn-cs"/>
+              </a:defRPr>
+            </a:lvl2pPr>
+            <a:lvl3pPr marL="1371600" indent="-384048" algn="l" defTabSz="914400" rtl="0" eaLnBrk="1" latinLnBrk="0" hangingPunct="1">
+              <a:lnSpc>
+                <a:spcPct val="94000"/>
+              </a:lnSpc>
+              <a:spcBef>
+                <a:spcPts val="500"/>
+              </a:spcBef>
+              <a:spcAft>
+                <a:spcPts val="200"/>
+              </a:spcAft>
+              <a:buFont typeface="Franklin Gothic Book" panose="020B0503020102020204" pitchFamily="34" charset="0"/>
+              <a:buChar char="■"/>
+              <a:defRPr sz="1800" kern="1200" baseline="0">
+                <a:solidFill>
+                  <a:schemeClr val="tx2"/>
+                </a:solidFill>
+                <a:latin typeface="+mn-lt"/>
+                <a:ea typeface="+mn-ea"/>
+                <a:cs typeface="+mn-cs"/>
+              </a:defRPr>
+            </a:lvl3pPr>
+            <a:lvl4pPr marL="1828800" indent="-384048" algn="l" defTabSz="914400" rtl="0" eaLnBrk="1" latinLnBrk="0" hangingPunct="1">
+              <a:lnSpc>
+                <a:spcPct val="94000"/>
+              </a:lnSpc>
+              <a:spcBef>
+                <a:spcPts val="500"/>
+              </a:spcBef>
+              <a:spcAft>
+                <a:spcPts val="200"/>
+              </a:spcAft>
+              <a:buFont typeface="Franklin Gothic Book" panose="020B0503020102020204" pitchFamily="34" charset="0"/>
+              <a:buChar char="–"/>
+              <a:defRPr sz="1800" i="1" kern="1200" baseline="0">
+                <a:solidFill>
+                  <a:schemeClr val="tx2"/>
+                </a:solidFill>
+                <a:latin typeface="+mn-lt"/>
+                <a:ea typeface="+mn-ea"/>
+                <a:cs typeface="+mn-cs"/>
+              </a:defRPr>
+            </a:lvl4pPr>
+            <a:lvl5pPr marL="2286000" indent="-384048" algn="l" defTabSz="914400" rtl="0" eaLnBrk="1" latinLnBrk="0" hangingPunct="1">
+              <a:lnSpc>
+                <a:spcPct val="94000"/>
+              </a:lnSpc>
+              <a:spcBef>
+                <a:spcPts val="500"/>
+              </a:spcBef>
+              <a:spcAft>
+                <a:spcPts val="200"/>
+              </a:spcAft>
+              <a:buFont typeface="Franklin Gothic Book" panose="020B0503020102020204" pitchFamily="34" charset="0"/>
+              <a:buChar char="■"/>
+              <a:defRPr sz="1600" kern="1200" baseline="0">
+                <a:solidFill>
+                  <a:schemeClr val="tx2"/>
+                </a:solidFill>
+                <a:latin typeface="+mn-lt"/>
+                <a:ea typeface="+mn-ea"/>
+                <a:cs typeface="+mn-cs"/>
+              </a:defRPr>
+            </a:lvl5pPr>
+            <a:lvl6pPr marL="2743200" indent="-384048" algn="l" defTabSz="914400" rtl="0" eaLnBrk="1" latinLnBrk="0" hangingPunct="1">
+              <a:lnSpc>
+                <a:spcPct val="94000"/>
+              </a:lnSpc>
+              <a:spcBef>
+                <a:spcPts val="500"/>
+              </a:spcBef>
+              <a:spcAft>
+                <a:spcPts val="200"/>
+              </a:spcAft>
+              <a:buFont typeface="Franklin Gothic Book" panose="020B0503020102020204" pitchFamily="34" charset="0"/>
+              <a:buChar char="–"/>
+              <a:defRPr sz="1600" i="1" kern="1200" baseline="0">
+                <a:solidFill>
+                  <a:schemeClr val="tx2"/>
+                </a:solidFill>
+                <a:latin typeface="+mn-lt"/>
+                <a:ea typeface="+mn-ea"/>
+                <a:cs typeface="+mn-cs"/>
+              </a:defRPr>
+            </a:lvl6pPr>
+            <a:lvl7pPr marL="3200400" indent="-384048" algn="l" defTabSz="914400" rtl="0" eaLnBrk="1" latinLnBrk="0" hangingPunct="1">
+              <a:lnSpc>
+                <a:spcPct val="94000"/>
+              </a:lnSpc>
+              <a:spcBef>
+                <a:spcPts val="500"/>
+              </a:spcBef>
+              <a:spcAft>
+                <a:spcPts val="200"/>
+              </a:spcAft>
+              <a:buFont typeface="Franklin Gothic Book" panose="020B0503020102020204" pitchFamily="34" charset="0"/>
+              <a:buChar char="■"/>
+              <a:defRPr sz="1400" kern="1200" baseline="0">
+                <a:solidFill>
+                  <a:schemeClr val="tx2"/>
+                </a:solidFill>
+                <a:latin typeface="+mn-lt"/>
+                <a:ea typeface="+mn-ea"/>
+                <a:cs typeface="+mn-cs"/>
+              </a:defRPr>
+            </a:lvl7pPr>
+            <a:lvl8pPr marL="3657600" indent="-384048" algn="l" defTabSz="914400" rtl="0" eaLnBrk="1" latinLnBrk="0" hangingPunct="1">
+              <a:lnSpc>
+                <a:spcPct val="94000"/>
+              </a:lnSpc>
+              <a:spcBef>
+                <a:spcPts val="500"/>
+              </a:spcBef>
+              <a:spcAft>
+                <a:spcPts val="200"/>
+              </a:spcAft>
+              <a:buFont typeface="Franklin Gothic Book" panose="020B0503020102020204" pitchFamily="34" charset="0"/>
+              <a:buChar char="–"/>
+              <a:defRPr sz="1400" i="1" kern="1200" baseline="0">
+                <a:solidFill>
+                  <a:schemeClr val="tx2"/>
+                </a:solidFill>
+                <a:latin typeface="+mn-lt"/>
+                <a:ea typeface="+mn-ea"/>
+                <a:cs typeface="+mn-cs"/>
+              </a:defRPr>
+            </a:lvl8pPr>
+            <a:lvl9pPr marL="4114800" indent="-384048" algn="l" defTabSz="914400" rtl="0" eaLnBrk="1" latinLnBrk="0" hangingPunct="1">
+              <a:lnSpc>
+                <a:spcPct val="94000"/>
+              </a:lnSpc>
+              <a:spcBef>
+                <a:spcPts val="500"/>
+              </a:spcBef>
+              <a:spcAft>
+                <a:spcPts val="200"/>
+              </a:spcAft>
+              <a:buFont typeface="Franklin Gothic Book" panose="020B0503020102020204" pitchFamily="34" charset="0"/>
+              <a:buChar char="■"/>
+              <a:defRPr sz="1400" kern="1200" baseline="0">
+                <a:solidFill>
+                  <a:schemeClr val="tx2"/>
+                </a:solidFill>
+                <a:latin typeface="+mn-lt"/>
+                <a:ea typeface="+mn-ea"/>
+                <a:cs typeface="+mn-cs"/>
+              </a:defRPr>
+            </a:lvl9pPr>
+          </a:lstStyle>
+          <a:p>
+            <a:r>
+              <a:rPr lang="en-US" dirty="0" smtClean="0"/>
+              <a:t>Deployment</a:t>
+            </a:r>
+            <a:endParaRPr lang="en-US" dirty="0" smtClean="0"/>
+          </a:p>
+          <a:p>
+            <a:pPr lvl="1"/>
+            <a:r>
+              <a:rPr lang="en-US" dirty="0" smtClean="0"/>
+              <a:t>Prototype </a:t>
             </a:r>
             <a:r>
               <a:rPr lang="mr-IN" dirty="0" smtClean="0"/>
@@ -4814,188 +5041,40 @@
             </a:r>
             <a:r>
               <a:rPr lang="en-US" dirty="0" smtClean="0"/>
-              <a:t> List top 3 relevant information to display for user to reference.</a:t>
-            </a:r>
-          </a:p>
-          <a:p>
-            <a:r>
-              <a:rPr lang="en-US" dirty="0" smtClean="0"/>
-              <a:t>JQuery Flip Plugin </a:t>
-            </a:r>
-            <a:r>
-              <a:rPr lang="mr-IN" dirty="0" smtClean="0"/>
-              <a:t>–</a:t>
-            </a:r>
-            <a:r>
-              <a:rPr lang="en-US" dirty="0" smtClean="0"/>
-              <a:t> Provide user experience to mimic flashcards.</a:t>
-            </a:r>
-          </a:p>
-          <a:p>
-            <a:r>
-              <a:rPr lang="en-US" dirty="0" smtClean="0"/>
-              <a:t>Google Sign-In via Firebase </a:t>
-            </a:r>
-            <a:r>
-              <a:rPr lang="mr-IN" dirty="0" smtClean="0"/>
-              <a:t>–</a:t>
-            </a:r>
-            <a:r>
-              <a:rPr lang="en-US" dirty="0" smtClean="0"/>
-              <a:t> Provide easier option for user to log-in.</a:t>
-            </a:r>
-          </a:p>
-          <a:p>
-            <a:r>
-              <a:rPr lang="en-US" dirty="0" err="1" smtClean="0"/>
-              <a:t>Giphy</a:t>
-            </a:r>
-            <a:r>
-              <a:rPr lang="en-US" dirty="0" smtClean="0"/>
-              <a:t> API </a:t>
-            </a:r>
-            <a:r>
-              <a:rPr lang="mr-IN" dirty="0" smtClean="0"/>
-              <a:t>–</a:t>
-            </a:r>
-            <a:r>
-              <a:rPr lang="en-US" dirty="0" smtClean="0"/>
-              <a:t> Provide fun and encouraging animated images for user.</a:t>
-            </a:r>
-          </a:p>
-          <a:p>
-            <a:r>
-              <a:rPr lang="en-US" dirty="0" smtClean="0"/>
-              <a:t>Firebase </a:t>
-            </a:r>
-            <a:r>
-              <a:rPr lang="mr-IN" dirty="0" smtClean="0"/>
-              <a:t>–</a:t>
-            </a:r>
-            <a:r>
-              <a:rPr lang="en-US" dirty="0" smtClean="0"/>
-              <a:t> House data.</a:t>
-            </a:r>
-          </a:p>
-          <a:p>
-            <a:r>
-              <a:rPr lang="en-US" dirty="0" err="1" smtClean="0"/>
-              <a:t>Draw.io</a:t>
-            </a:r>
-            <a:r>
-              <a:rPr lang="en-US" dirty="0" smtClean="0"/>
-              <a:t> </a:t>
-            </a:r>
-            <a:r>
-              <a:rPr lang="mr-IN" dirty="0" smtClean="0"/>
-              <a:t>–</a:t>
-            </a:r>
-            <a:r>
-              <a:rPr lang="en-US" dirty="0" smtClean="0"/>
-              <a:t> Online system to allow to draw out a wireframe.</a:t>
-            </a:r>
-          </a:p>
-          <a:p>
-            <a:r>
-              <a:rPr lang="en-US" dirty="0" err="1" smtClean="0"/>
-              <a:t>Pnotify</a:t>
-            </a:r>
-            <a:r>
-              <a:rPr lang="en-US" dirty="0" smtClean="0"/>
-              <a:t> </a:t>
-            </a:r>
-            <a:r>
-              <a:rPr lang="mr-IN" dirty="0" smtClean="0"/>
-              <a:t>–</a:t>
-            </a:r>
-            <a:r>
-              <a:rPr lang="en-US" dirty="0" smtClean="0"/>
-              <a:t> Notification system.</a:t>
-            </a:r>
-          </a:p>
-          <a:p>
-            <a:r>
-              <a:rPr lang="en-US" dirty="0" err="1" smtClean="0"/>
-              <a:t>Pixlr</a:t>
-            </a:r>
-            <a:r>
-              <a:rPr lang="en-US" dirty="0" smtClean="0"/>
-              <a:t> Editor </a:t>
-            </a:r>
-            <a:r>
-              <a:rPr lang="mr-IN" dirty="0" smtClean="0"/>
-              <a:t>–</a:t>
-            </a:r>
-            <a:r>
-              <a:rPr lang="en-US" dirty="0" smtClean="0"/>
-              <a:t> Create logo</a:t>
-            </a:r>
-            <a:r>
-              <a:rPr lang="en-US" dirty="0" smtClean="0"/>
-              <a:t>.</a:t>
-            </a:r>
-          </a:p>
-          <a:p>
-            <a:r>
-              <a:rPr lang="en-US" dirty="0" smtClean="0"/>
-              <a:t>Trello </a:t>
-            </a:r>
-            <a:r>
-              <a:rPr lang="mr-IN" dirty="0" smtClean="0"/>
-              <a:t>–</a:t>
-            </a:r>
-            <a:r>
-              <a:rPr lang="en-US" dirty="0" smtClean="0"/>
-              <a:t> Lay out and assigning tasks.</a:t>
-            </a:r>
-          </a:p>
-          <a:p>
-            <a:r>
-              <a:rPr lang="en-US" dirty="0" err="1" smtClean="0"/>
-              <a:t>GitKraken</a:t>
-            </a:r>
-            <a:r>
-              <a:rPr lang="en-US" dirty="0" smtClean="0"/>
-              <a:t> </a:t>
-            </a:r>
-            <a:r>
-              <a:rPr lang="mr-IN" dirty="0" smtClean="0"/>
-              <a:t>–</a:t>
-            </a:r>
-            <a:r>
-              <a:rPr lang="en-US" dirty="0" smtClean="0"/>
-              <a:t> GUI (Graphical User Interface) version control interface.</a:t>
-            </a:r>
-          </a:p>
-          <a:p>
-            <a:r>
-              <a:rPr lang="en-US" dirty="0" smtClean="0"/>
-              <a:t>GitHub - </a:t>
-            </a:r>
+              <a:t> Beta Testing</a:t>
+            </a:r>
+            <a:endParaRPr lang="en-US" dirty="0"/>
+          </a:p>
+          <a:p>
+            <a:pPr lvl="1"/>
             <a:r>
               <a:rPr lang="en-US" dirty="0"/>
-              <a:t>V</a:t>
-            </a:r>
-            <a:r>
-              <a:rPr lang="en-US" dirty="0" smtClean="0"/>
-              <a:t>ersion </a:t>
-            </a:r>
-            <a:r>
-              <a:rPr lang="en-US" dirty="0"/>
-              <a:t>control and source code </a:t>
-            </a:r>
-            <a:r>
-              <a:rPr lang="en-US" dirty="0" smtClean="0"/>
-              <a:t>management system.</a:t>
-            </a:r>
-            <a:endParaRPr lang="en-US" dirty="0"/>
+              <a:t>RCT (Rapid Cycle Testing)</a:t>
+            </a:r>
+          </a:p>
+          <a:p>
+            <a:r>
+              <a:rPr lang="en-US" dirty="0" smtClean="0"/>
+              <a:t>Release</a:t>
+            </a:r>
+          </a:p>
+          <a:p>
+            <a:pPr lvl="1"/>
+            <a:r>
+              <a:rPr lang="en-US" dirty="0" smtClean="0"/>
+              <a:t>Making it available to everyone</a:t>
+            </a:r>
+            <a:endParaRPr lang="en-US" dirty="0"/>
+          </a:p>
+          <a:p>
+            <a:endParaRPr lang="en-US" dirty="0" smtClean="0"/>
           </a:p>
         </p:txBody>
       </p:sp>
     </p:spTree>
     <p:extLst>
       <p:ext uri="{BB962C8B-B14F-4D97-AF65-F5344CB8AC3E}">
-        <p14:creationId xmlns:p14="http://schemas.microsoft.com/office/powerpoint/2010/main" val="177022474"/>
+        <p14:creationId xmlns:p14="http://schemas.microsoft.com/office/powerpoint/2010/main" val="1788068256"/>
       </p:ext>
     </p:extLst>
   </p:cSld>
@@ -5045,10 +5124,25 @@
           <a:lstStyle/>
           <a:p>
             <a:r>
-              <a:rPr lang="en-US" dirty="0" smtClean="0"/>
-              <a:t>Demo</a:t>
-            </a:r>
-            <a:endParaRPr lang="en-US" dirty="0"/>
+              <a:rPr lang="en-US" dirty="0"/>
+              <a:t>T</a:t>
+            </a:r>
+            <a:r>
+              <a:rPr lang="en-US" dirty="0" smtClean="0"/>
+              <a:t>echnologies Used </a:t>
+            </a:r>
+            <a:r>
+              <a:rPr lang="en-US" dirty="0"/>
+              <a:t>(and </a:t>
+            </a:r>
+            <a:r>
+              <a:rPr lang="en-US" dirty="0" smtClean="0"/>
+              <a:t>how </a:t>
+            </a:r>
+            <a:r>
+              <a:rPr lang="en-US" dirty="0"/>
+              <a:t>they work)</a:t>
+            </a:r>
           </a:p>
         </p:txBody>
       </p:sp>
@@ -5064,18 +5158,195 @@
         </p:nvSpPr>
         <p:spPr/>
         <p:txBody>
-          <a:bodyPr/>
+          <a:bodyPr>
+            <a:normAutofit fontScale="70000" lnSpcReduction="20000"/>
+          </a:bodyPr>
           <a:lstStyle/>
           <a:p>
             <a:r>
-              <a:rPr lang="en-US" dirty="0" smtClean="0">
-                <a:hlinkClick r:id="rId2"/>
-              </a:rPr>
-              <a:t>codeDeck</a:t>
-            </a:r>
-            <a:endParaRPr lang="en-US" dirty="0" smtClean="0"/>
-          </a:p>
-          <a:p>
+              <a:rPr lang="en-US" dirty="0" smtClean="0"/>
+              <a:t>Wikipedia API </a:t>
+            </a:r>
+            <a:r>
+              <a:rPr lang="mr-IN" dirty="0" smtClean="0"/>
+              <a:t>–</a:t>
+            </a:r>
+            <a:r>
+              <a:rPr lang="en-US" dirty="0" smtClean="0"/>
+              <a:t> List top 3 relevant information to display for user to reference.</a:t>
+            </a:r>
+          </a:p>
+          <a:p>
+            <a:r>
+              <a:rPr lang="en-US" dirty="0" smtClean="0"/>
+              <a:t>JQuery Flip Plugin </a:t>
+            </a:r>
+            <a:r>
+              <a:rPr lang="mr-IN" dirty="0" smtClean="0"/>
+              <a:t>–</a:t>
+            </a:r>
+            <a:r>
+              <a:rPr lang="en-US" dirty="0" smtClean="0"/>
+              <a:t> Provide user experience to mimic flashcards.</a:t>
+            </a:r>
+          </a:p>
+          <a:p>
+            <a:r>
+              <a:rPr lang="en-US" dirty="0" smtClean="0"/>
+              <a:t>Google Sign-In via Firebase </a:t>
+            </a:r>
+            <a:r>
+              <a:rPr lang="mr-IN" dirty="0" smtClean="0"/>
+              <a:t>–</a:t>
+            </a:r>
+            <a:r>
+              <a:rPr lang="en-US" dirty="0" smtClean="0"/>
+              <a:t> Provide easier option for user to log-in.</a:t>
+            </a:r>
+          </a:p>
+          <a:p>
+            <a:r>
+              <a:rPr lang="en-US" dirty="0" err="1" smtClean="0"/>
+              <a:t>Giphy</a:t>
+            </a:r>
+            <a:r>
+              <a:rPr lang="en-US" dirty="0" smtClean="0"/>
+              <a:t> API </a:t>
+            </a:r>
+            <a:r>
+              <a:rPr lang="mr-IN" dirty="0" smtClean="0"/>
+              <a:t>–</a:t>
+            </a:r>
+            <a:r>
+              <a:rPr lang="en-US" dirty="0" smtClean="0"/>
+              <a:t> Provide fun and encouraging animated images for user.</a:t>
+            </a:r>
+          </a:p>
+          <a:p>
+            <a:r>
+              <a:rPr lang="en-US" dirty="0" smtClean="0"/>
+              <a:t>Firebase </a:t>
+            </a:r>
+            <a:r>
+              <a:rPr lang="mr-IN" dirty="0" smtClean="0"/>
+              <a:t>–</a:t>
+            </a:r>
+            <a:r>
+              <a:rPr lang="en-US" dirty="0" smtClean="0"/>
+              <a:t> House data.</a:t>
+            </a:r>
+          </a:p>
+          <a:p>
+            <a:r>
+              <a:rPr lang="en-US" dirty="0" err="1" smtClean="0"/>
+              <a:t>Draw.io</a:t>
+            </a:r>
+            <a:r>
+              <a:rPr lang="en-US" dirty="0" smtClean="0"/>
+              <a:t> </a:t>
+            </a:r>
+            <a:r>
+              <a:rPr lang="mr-IN" dirty="0" smtClean="0"/>
+              <a:t>–</a:t>
+            </a:r>
+            <a:r>
+              <a:rPr lang="en-US" dirty="0" smtClean="0"/>
+              <a:t> Online system to allow to draw out a wireframe.</a:t>
+            </a:r>
+          </a:p>
+          <a:p>
+            <a:r>
+              <a:rPr lang="en-US" dirty="0" err="1" smtClean="0"/>
+              <a:t>Pnotify</a:t>
+            </a:r>
+            <a:r>
+              <a:rPr lang="en-US" dirty="0" smtClean="0"/>
+              <a:t> </a:t>
+            </a:r>
+            <a:r>
+              <a:rPr lang="mr-IN" dirty="0" smtClean="0"/>
+              <a:t>–</a:t>
+            </a:r>
+            <a:r>
+              <a:rPr lang="en-US" dirty="0" smtClean="0"/>
+              <a:t> Notification system.</a:t>
+            </a:r>
+          </a:p>
+          <a:p>
+            <a:r>
+              <a:rPr lang="en-US" dirty="0" err="1" smtClean="0"/>
+              <a:t>Pixlr</a:t>
+            </a:r>
+            <a:r>
+              <a:rPr lang="en-US" dirty="0" smtClean="0"/>
+              <a:t> Editor </a:t>
+            </a:r>
+            <a:r>
+              <a:rPr lang="mr-IN" dirty="0" smtClean="0"/>
+              <a:t>–</a:t>
+            </a:r>
+            <a:r>
+              <a:rPr lang="en-US" dirty="0" smtClean="0"/>
+              <a:t> Create logo</a:t>
+            </a:r>
+            <a:r>
+              <a:rPr lang="en-US" dirty="0" smtClean="0"/>
+              <a:t>.</a:t>
+            </a:r>
+          </a:p>
+          <a:p>
+            <a:r>
+              <a:rPr lang="en-US" dirty="0" smtClean="0"/>
+              <a:t>Trello </a:t>
+            </a:r>
+            <a:r>
+              <a:rPr lang="mr-IN" dirty="0" smtClean="0"/>
+              <a:t>–</a:t>
+            </a:r>
+            <a:r>
+              <a:rPr lang="en-US" dirty="0" smtClean="0"/>
+              <a:t> Lay out and assigning tasks.</a:t>
+            </a:r>
+          </a:p>
+          <a:p>
+            <a:r>
+              <a:rPr lang="en-US" dirty="0" err="1" smtClean="0"/>
+              <a:t>GitKraken</a:t>
+            </a:r>
+            <a:r>
+              <a:rPr lang="en-US" dirty="0" smtClean="0"/>
+              <a:t> </a:t>
+            </a:r>
+            <a:r>
+              <a:rPr lang="mr-IN" dirty="0" smtClean="0"/>
+              <a:t>–</a:t>
+            </a:r>
+            <a:r>
+              <a:rPr lang="en-US" dirty="0" smtClean="0"/>
+              <a:t> GUI (Graphical User Interface) version control interface.</a:t>
+            </a:r>
+          </a:p>
+          <a:p>
+            <a:r>
+              <a:rPr lang="en-US" dirty="0" smtClean="0"/>
+              <a:t>GitHub - </a:t>
+            </a:r>
+            <a:r>
+              <a:rPr lang="en-US" dirty="0"/>
+              <a:t>V</a:t>
+            </a:r>
+            <a:r>
+              <a:rPr lang="en-US" dirty="0" smtClean="0"/>
+              <a:t>ersion </a:t>
+            </a:r>
+            <a:r>
+              <a:rPr lang="en-US" dirty="0"/>
+              <a:t>control and source code </a:t>
+            </a:r>
+            <a:r>
+              <a:rPr lang="en-US" dirty="0" smtClean="0"/>
+              <a:t>management system.</a:t>
+            </a:r>
             <a:endParaRPr lang="en-US" dirty="0"/>
           </a:p>
         </p:txBody>
@@ -5083,7 +5354,7 @@
     </p:spTree>
     <p:extLst>
       <p:ext uri="{BB962C8B-B14F-4D97-AF65-F5344CB8AC3E}">
-        <p14:creationId xmlns:p14="http://schemas.microsoft.com/office/powerpoint/2010/main" val="1463705858"/>
+        <p14:creationId xmlns:p14="http://schemas.microsoft.com/office/powerpoint/2010/main" val="177022474"/>
       </p:ext>
     </p:extLst>
   </p:cSld>
@@ -5133,12 +5404,8 @@
           <a:lstStyle/>
           <a:p>
             <a:r>
-              <a:rPr lang="en-US" dirty="0"/>
-              <a:t>Directions for </a:t>
-            </a:r>
-            <a:r>
-              <a:rPr lang="en-US" dirty="0" smtClean="0"/>
-              <a:t>Future Development</a:t>
+              <a:rPr lang="en-US" dirty="0" smtClean="0"/>
+              <a:t>Demo</a:t>
             </a:r>
             <a:endParaRPr lang="en-US" dirty="0"/>
           </a:p>
@@ -5160,59 +5427,22 @@
           <a:lstStyle/>
           <a:p>
             <a:r>
-              <a:rPr lang="en-US" dirty="0" smtClean="0"/>
-              <a:t> </a:t>
-            </a:r>
-            <a:r>
-              <a:rPr lang="en-US" dirty="0"/>
-              <a:t>To create a more robust application, featuring:</a:t>
-            </a:r>
-          </a:p>
-          <a:p>
-            <a:pPr lvl="1"/>
-            <a:r>
-              <a:rPr lang="en-US" dirty="0"/>
-              <a:t>Displaying number of people currently using the deck.</a:t>
-            </a:r>
-          </a:p>
-          <a:p>
-            <a:pPr lvl="1"/>
-            <a:r>
-              <a:rPr lang="en-US" dirty="0"/>
-              <a:t>Provide knowledge quiz for user to test retention of information.</a:t>
-            </a:r>
-          </a:p>
-          <a:p>
-            <a:pPr lvl="1"/>
-            <a:r>
-              <a:rPr lang="en-US" dirty="0"/>
-              <a:t>Provide options for user to print deck of cards</a:t>
-            </a:r>
-            <a:r>
-              <a:rPr lang="en-US" dirty="0" smtClean="0"/>
-              <a:t>.</a:t>
-            </a:r>
-          </a:p>
-          <a:p>
-            <a:pPr lvl="1"/>
-            <a:r>
-              <a:rPr lang="en-US" dirty="0" smtClean="0"/>
-              <a:t>Provide additional deck of cards on other topics of code.</a:t>
-            </a:r>
-            <a:endParaRPr lang="en-US" dirty="0"/>
-          </a:p>
-          <a:p>
+              <a:rPr lang="en-US" dirty="0" smtClean="0">
+                <a:hlinkClick r:id="rId2"/>
+              </a:rPr>
+              <a:t>codeDeck</a:t>
+            </a:r>
             <a:endParaRPr lang="en-US" dirty="0" smtClean="0"/>
           </a:p>
           <a:p>
-            <a:endParaRPr lang="en-US" dirty="0" smtClean="0"/>
+            <a:endParaRPr lang="en-US" dirty="0"/>
           </a:p>
         </p:txBody>
       </p:sp>
     </p:spTree>
     <p:extLst>
       <p:ext uri="{BB962C8B-B14F-4D97-AF65-F5344CB8AC3E}">
-        <p14:creationId xmlns:p14="http://schemas.microsoft.com/office/powerpoint/2010/main" val="1079179021"/>
+        <p14:creationId xmlns:p14="http://schemas.microsoft.com/office/powerpoint/2010/main" val="1463705858"/>
       </p:ext>
     </p:extLst>
   </p:cSld>
@@ -5262,8 +5492,12 @@
           <a:lstStyle/>
           <a:p>
             <a:r>
-              <a:rPr lang="en-US" dirty="0" smtClean="0"/>
-              <a:t>Marketing Plan</a:t>
+              <a:rPr lang="en-US" dirty="0"/>
+              <a:t>Directions for </a:t>
+            </a:r>
+            <a:r>
+              <a:rPr lang="en-US" dirty="0" smtClean="0"/>
+              <a:t>Future Development</a:t>
             </a:r>
             <a:endParaRPr lang="en-US" dirty="0"/>
           </a:p>
@@ -5281,60 +5515,37 @@
         </p:nvSpPr>
         <p:spPr/>
         <p:txBody>
-          <a:bodyPr>
-            <a:normAutofit fontScale="92500" lnSpcReduction="20000"/>
-          </a:bodyPr>
+          <a:bodyPr/>
           <a:lstStyle/>
           <a:p>
             <a:r>
               <a:rPr lang="en-US" dirty="0" smtClean="0"/>
-              <a:t>Word-of-Mouth </a:t>
+              <a:t> </a:t>
             </a:r>
             <a:r>
               <a:rPr lang="en-US" dirty="0"/>
-              <a:t>M</a:t>
-            </a:r>
-            <a:r>
-              <a:rPr lang="en-US" dirty="0" smtClean="0"/>
-              <a:t>arketing </a:t>
-            </a:r>
+              <a:t>To create a more robust application, featuring:</a:t>
+            </a:r>
+          </a:p>
+          <a:p>
+            <a:pPr lvl="1"/>
             <a:r>
               <a:rPr lang="en-US" dirty="0"/>
-              <a:t>(WOMM</a:t>
-            </a:r>
-            <a:r>
-              <a:rPr lang="en-US" dirty="0" smtClean="0"/>
-              <a:t>)</a:t>
-            </a:r>
-          </a:p>
-          <a:p>
+              <a:t>Displaying number of people currently using the deck.</a:t>
+            </a:r>
+          </a:p>
+          <a:p>
+            <a:pPr lvl="1"/>
             <a:r>
               <a:rPr lang="en-US" dirty="0"/>
-              <a:t>S</a:t>
-            </a:r>
-            <a:r>
-              <a:rPr lang="en-US" dirty="0" smtClean="0"/>
-              <a:t>ocial </a:t>
-            </a:r>
+              <a:t>Provide knowledge quiz for user to test retention of information.</a:t>
+            </a:r>
+          </a:p>
+          <a:p>
+            <a:pPr lvl="1"/>
             <a:r>
               <a:rPr lang="en-US" dirty="0"/>
-              <a:t>M</a:t>
-            </a:r>
-            <a:r>
-              <a:rPr lang="en-US" dirty="0" smtClean="0"/>
-              <a:t>edia </a:t>
-            </a:r>
-            <a:r>
-              <a:rPr lang="en-US" dirty="0"/>
-              <a:t>T</a:t>
-            </a:r>
-            <a:r>
-              <a:rPr lang="en-US" dirty="0" smtClean="0"/>
-              <a:t>ools </a:t>
-            </a:r>
-            <a:r>
-              <a:rPr lang="en-US" dirty="0"/>
-              <a:t>like Twitter, Weblogs, etc</a:t>
+              <a:t>Provide options for user to print deck of cards</a:t>
             </a:r>
             <a:r>
               <a:rPr lang="en-US" dirty="0" smtClean="0"/>
@@ -5342,142 +5553,25 @@
             </a:r>
           </a:p>
           <a:p>
-            <a:r>
-              <a:rPr lang="en-US" dirty="0" smtClean="0"/>
-              <a:t>Write up proposals for industry that would defines </a:t>
-            </a:r>
-            <a:r>
-              <a:rPr lang="en-US" dirty="0"/>
-              <a:t>the product's goals, identifies </a:t>
-            </a:r>
-            <a:r>
-              <a:rPr lang="en-US" dirty="0" smtClean="0"/>
-              <a:t>the benefits </a:t>
-            </a:r>
-            <a:r>
-              <a:rPr lang="en-US" dirty="0"/>
-              <a:t>of the </a:t>
-            </a:r>
-            <a:r>
-              <a:rPr lang="en-US" dirty="0" smtClean="0"/>
-              <a:t>service</a:t>
-            </a:r>
-            <a:r>
-              <a:rPr lang="en-US" dirty="0"/>
-              <a:t>, and offers users actionable links to </a:t>
-            </a:r>
-            <a:r>
-              <a:rPr lang="en-US" dirty="0" smtClean="0"/>
-              <a:t>access </a:t>
-            </a:r>
-            <a:r>
-              <a:rPr lang="en-US" dirty="0"/>
-              <a:t>the </a:t>
-            </a:r>
-            <a:r>
-              <a:rPr lang="en-US" dirty="0" smtClean="0"/>
-              <a:t>application.</a:t>
-            </a:r>
-          </a:p>
-          <a:p>
-            <a:r>
-              <a:rPr lang="en-US" dirty="0"/>
-              <a:t>GitHub </a:t>
-            </a:r>
-            <a:r>
-              <a:rPr lang="en-US" dirty="0" smtClean="0"/>
-              <a:t>to allow users to download and operate their own version of the application.</a:t>
-            </a:r>
-          </a:p>
-          <a:p>
-            <a:r>
-              <a:rPr lang="en-US" dirty="0" smtClean="0"/>
-              <a:t>Reaching out to industry’s for sponsorships such as </a:t>
-            </a:r>
-            <a:r>
-              <a:rPr lang="en-US" dirty="0" err="1" smtClean="0"/>
-              <a:t>Codeacademy</a:t>
-            </a:r>
-            <a:r>
-              <a:rPr lang="en-US" dirty="0" smtClean="0"/>
-              <a:t>, </a:t>
-            </a:r>
-            <a:r>
-              <a:rPr lang="en-US" dirty="0" err="1" smtClean="0"/>
-              <a:t>Udemy</a:t>
-            </a:r>
-            <a:r>
-              <a:rPr lang="en-US" dirty="0" smtClean="0"/>
-              <a:t>, Universities,  etc.</a:t>
-            </a:r>
-          </a:p>
-          <a:p>
             <a:pPr lvl="1"/>
             <a:r>
               <a:rPr lang="en-US" dirty="0" smtClean="0"/>
-              <a:t>Universities to include: Keiser University, Platt College, LaSalle College Vancouver, etc.</a:t>
-            </a:r>
-          </a:p>
-          <a:p>
-            <a:r>
-              <a:rPr lang="en-US" dirty="0" smtClean="0"/>
-              <a:t>Utilizing </a:t>
-            </a:r>
-            <a:r>
-              <a:rPr lang="en-US" dirty="0"/>
-              <a:t>A</a:t>
-            </a:r>
-            <a:r>
-              <a:rPr lang="en-US" dirty="0" smtClean="0"/>
-              <a:t>dSense from Google to help drive revenue.</a:t>
-            </a:r>
-            <a:endParaRPr lang="en-US" dirty="0"/>
-          </a:p>
-          <a:p>
-            <a:r>
-              <a:rPr lang="en-US" dirty="0" smtClean="0">
-                <a:solidFill>
-                  <a:schemeClr val="tx1"/>
-                </a:solidFill>
-              </a:rPr>
-              <a:t>We w</a:t>
-            </a:r>
-            <a:r>
-              <a:rPr lang="en-US" dirty="0" smtClean="0">
-                <a:solidFill>
-                  <a:schemeClr val="tx1"/>
-                </a:solidFill>
-              </a:rPr>
-              <a:t>ill offer </a:t>
-            </a:r>
-            <a:r>
-              <a:rPr lang="en-US" dirty="0" smtClean="0">
-                <a:solidFill>
-                  <a:schemeClr val="tx1"/>
-                </a:solidFill>
-              </a:rPr>
-              <a:t>online version on top </a:t>
-            </a:r>
-            <a:r>
-              <a:rPr lang="en-US" dirty="0" smtClean="0">
-                <a:solidFill>
-                  <a:schemeClr val="tx1"/>
-                </a:solidFill>
-              </a:rPr>
-              <a:t>of download version.</a:t>
-            </a:r>
-            <a:endParaRPr lang="en-US" dirty="0">
-              <a:solidFill>
-                <a:schemeClr val="tx1"/>
-              </a:solidFill>
-            </a:endParaRPr>
+              <a:t>Provide additional deck of cards on other topics of code.</a:t>
+            </a:r>
+            <a:endParaRPr lang="en-US" dirty="0"/>
+          </a:p>
+          <a:p>
+            <a:endParaRPr lang="en-US" dirty="0" smtClean="0"/>
+          </a:p>
+          <a:p>
+            <a:endParaRPr lang="en-US" dirty="0" smtClean="0"/>
           </a:p>
         </p:txBody>
       </p:sp>
     </p:spTree>
     <p:extLst>
       <p:ext uri="{BB962C8B-B14F-4D97-AF65-F5344CB8AC3E}">
-        <p14:creationId xmlns:p14="http://schemas.microsoft.com/office/powerpoint/2010/main" val="1040487182"/>
+        <p14:creationId xmlns:p14="http://schemas.microsoft.com/office/powerpoint/2010/main" val="1079179021"/>
       </p:ext>
     </p:extLst>
   </p:cSld>
@@ -5528,7 +5622,7 @@
           <a:p>
             <a:r>
               <a:rPr lang="en-US" dirty="0" smtClean="0"/>
-              <a:t>Cost</a:t>
+              <a:t>Marketing Plan</a:t>
             </a:r>
             <a:endParaRPr lang="en-US" dirty="0"/>
           </a:p>
@@ -5547,17 +5641,165 @@
         <p:spPr/>
         <p:txBody>
           <a:bodyPr>
-            <a:normAutofit/>
+            <a:normAutofit fontScale="92500" lnSpcReduction="20000"/>
           </a:bodyPr>
           <a:lstStyle/>
           <a:p>
             <a:r>
-              <a:rPr lang="en-US" dirty="0">
+              <a:rPr lang="en-US" dirty="0" smtClean="0"/>
+              <a:t>Word-of-Mouth </a:t>
+            </a:r>
+            <a:r>
+              <a:rPr lang="en-US" dirty="0"/>
+              <a:t>M</a:t>
+            </a:r>
+            <a:r>
+              <a:rPr lang="en-US" dirty="0" smtClean="0"/>
+              <a:t>arketing </a:t>
+            </a:r>
+            <a:r>
+              <a:rPr lang="en-US" dirty="0"/>
+              <a:t>(WOMM</a:t>
+            </a:r>
+            <a:r>
+              <a:rPr lang="en-US" dirty="0" smtClean="0"/>
+              <a:t>)</a:t>
+            </a:r>
+          </a:p>
+          <a:p>
+            <a:r>
+              <a:rPr lang="en-US" dirty="0"/>
+              <a:t>S</a:t>
+            </a:r>
+            <a:r>
+              <a:rPr lang="en-US" dirty="0" smtClean="0"/>
+              <a:t>ocial </a:t>
+            </a:r>
+            <a:r>
+              <a:rPr lang="en-US" dirty="0"/>
+              <a:t>M</a:t>
+            </a:r>
+            <a:r>
+              <a:rPr lang="en-US" dirty="0" smtClean="0"/>
+              <a:t>edia </a:t>
+            </a:r>
+            <a:r>
+              <a:rPr lang="en-US" dirty="0"/>
+              <a:t>T</a:t>
+            </a:r>
+            <a:r>
+              <a:rPr lang="en-US" dirty="0" smtClean="0"/>
+              <a:t>ools </a:t>
+            </a:r>
+            <a:r>
+              <a:rPr lang="en-US" dirty="0"/>
+              <a:t>like Twitter, Weblogs, etc</a:t>
+            </a:r>
+            <a:r>
+              <a:rPr lang="en-US" dirty="0" smtClean="0"/>
+              <a:t>.</a:t>
+            </a:r>
+          </a:p>
+          <a:p>
+            <a:r>
+              <a:rPr lang="en-US" dirty="0" smtClean="0"/>
+              <a:t>Write up proposals for industry that would defines </a:t>
+            </a:r>
+            <a:r>
+              <a:rPr lang="en-US" dirty="0"/>
+              <a:t>the product's goals, identifies </a:t>
+            </a:r>
+            <a:r>
+              <a:rPr lang="en-US" dirty="0" smtClean="0"/>
+              <a:t>the benefits </a:t>
+            </a:r>
+            <a:r>
+              <a:rPr lang="en-US" dirty="0"/>
+              <a:t>of the </a:t>
+            </a:r>
+            <a:r>
+              <a:rPr lang="en-US" dirty="0" smtClean="0"/>
+              <a:t>service</a:t>
+            </a:r>
+            <a:r>
+              <a:rPr lang="en-US" dirty="0"/>
+              <a:t>, and offers users actionable links to </a:t>
+            </a:r>
+            <a:r>
+              <a:rPr lang="en-US" dirty="0" smtClean="0"/>
+              <a:t>access </a:t>
+            </a:r>
+            <a:r>
+              <a:rPr lang="en-US" dirty="0"/>
+              <a:t>the </a:t>
+            </a:r>
+            <a:r>
+              <a:rPr lang="en-US" dirty="0" smtClean="0"/>
+              <a:t>application.</a:t>
+            </a:r>
+          </a:p>
+          <a:p>
+            <a:r>
+              <a:rPr lang="en-US" dirty="0"/>
+              <a:t>GitHub </a:t>
+            </a:r>
+            <a:r>
+              <a:rPr lang="en-US" dirty="0" smtClean="0"/>
+              <a:t>to allow users to download and operate their own version of the application.</a:t>
+            </a:r>
+          </a:p>
+          <a:p>
+            <a:r>
+              <a:rPr lang="en-US" dirty="0" smtClean="0"/>
+              <a:t>Reaching out to industry’s for sponsorships such as </a:t>
+            </a:r>
+            <a:r>
+              <a:rPr lang="en-US" dirty="0" err="1" smtClean="0"/>
+              <a:t>Codeacademy</a:t>
+            </a:r>
+            <a:r>
+              <a:rPr lang="en-US" dirty="0" smtClean="0"/>
+              <a:t>, </a:t>
+            </a:r>
+            <a:r>
+              <a:rPr lang="en-US" dirty="0" err="1" smtClean="0"/>
+              <a:t>Udemy</a:t>
+            </a:r>
+            <a:r>
+              <a:rPr lang="en-US" dirty="0" smtClean="0"/>
+              <a:t>, Universities,  etc.</a:t>
+            </a:r>
+          </a:p>
+          <a:p>
+            <a:pPr lvl="1"/>
+            <a:r>
+              <a:rPr lang="en-US" dirty="0" smtClean="0"/>
+              <a:t>Universities to include: Keiser University, Platt College, LaSalle College Vancouver, etc.</a:t>
+            </a:r>
+          </a:p>
+          <a:p>
+            <a:r>
+              <a:rPr lang="en-US" dirty="0" smtClean="0"/>
+              <a:t>Utilizing </a:t>
+            </a:r>
+            <a:r>
+              <a:rPr lang="en-US" dirty="0"/>
+              <a:t>A</a:t>
+            </a:r>
+            <a:r>
+              <a:rPr lang="en-US" dirty="0" smtClean="0"/>
+              <a:t>dSense from Google to help drive revenue.</a:t>
+            </a:r>
+            <a:endParaRPr lang="en-US" dirty="0"/>
+          </a:p>
+          <a:p>
+            <a:r>
+              <a:rPr lang="en-US" dirty="0" smtClean="0">
                 <a:solidFill>
                   <a:schemeClr val="tx1"/>
                 </a:solidFill>
               </a:rPr>
-              <a:t>Estimated amount of </a:t>
+              <a:t>We w</a:t>
             </a:r>
             <a:r>
               <a:rPr lang="en-US" dirty="0" smtClean="0">
@@ -5565,123 +5807,25 @@
                   <a:schemeClr val="tx1"/>
                 </a:solidFill>
               </a:rPr>
-              <a:t>hours initially:</a:t>
-            </a:r>
-          </a:p>
-          <a:p>
+              <a:t>ill offer </a:t>
+            </a:r>
             <a:r>
               <a:rPr lang="en-US" dirty="0" smtClean="0">
                 <a:solidFill>
                   <a:schemeClr val="tx1"/>
                 </a:solidFill>
               </a:rPr>
-              <a:t>Estimated amount of hours ongoing:</a:t>
-            </a:r>
-          </a:p>
-          <a:p>
-            <a:r>
-              <a:rPr lang="en-US" dirty="0">
+              <a:t>online version on top </a:t>
+            </a:r>
+            <a:r>
+              <a:rPr lang="en-US" dirty="0" smtClean="0">
                 <a:solidFill>
                   <a:schemeClr val="tx1"/>
                 </a:solidFill>
               </a:rPr>
-              <a:t>C</a:t>
-            </a:r>
-            <a:r>
-              <a:rPr lang="en-US" dirty="0" smtClean="0">
-                <a:solidFill>
-                  <a:schemeClr val="tx1"/>
-                </a:solidFill>
-              </a:rPr>
-              <a:t>ost </a:t>
-            </a:r>
-            <a:r>
-              <a:rPr lang="en-US" dirty="0">
-                <a:solidFill>
-                  <a:schemeClr val="tx1"/>
-                </a:solidFill>
-              </a:rPr>
-              <a:t>to run application for </a:t>
-            </a:r>
-            <a:r>
-              <a:rPr lang="en-US" dirty="0" smtClean="0">
-                <a:solidFill>
-                  <a:schemeClr val="tx1"/>
-                </a:solidFill>
-              </a:rPr>
-              <a:t>demo: $0</a:t>
-            </a:r>
-          </a:p>
-          <a:p>
-            <a:r>
-              <a:rPr lang="en-US" dirty="0" smtClean="0">
-                <a:solidFill>
-                  <a:schemeClr val="tx1"/>
-                </a:solidFill>
-              </a:rPr>
-              <a:t>Firebase: </a:t>
-            </a:r>
-            <a:r>
-              <a:rPr lang="en-US" dirty="0" smtClean="0">
-                <a:solidFill>
-                  <a:schemeClr val="tx1"/>
-                </a:solidFill>
-              </a:rPr>
-              <a:t>$0 </a:t>
-            </a:r>
-            <a:r>
-              <a:rPr lang="en-US" dirty="0" smtClean="0">
-                <a:solidFill>
-                  <a:schemeClr val="tx1"/>
-                </a:solidFill>
-              </a:rPr>
-              <a:t>otherwise $25/year for 100k/instances </a:t>
-            </a:r>
-            <a:r>
-              <a:rPr lang="en-US" dirty="0" smtClean="0">
-                <a:solidFill>
-                  <a:schemeClr val="tx1"/>
-                </a:solidFill>
-              </a:rPr>
-              <a:t>for simultaneous connections and/or 50GB for storage.</a:t>
-            </a:r>
-          </a:p>
-          <a:p>
-            <a:r>
-              <a:rPr lang="en-US" dirty="0" smtClean="0">
-                <a:solidFill>
-                  <a:schemeClr val="tx1"/>
-                </a:solidFill>
-              </a:rPr>
-              <a:t>Domain (Google): $12/year </a:t>
-            </a:r>
-          </a:p>
-          <a:p>
-            <a:r>
-              <a:rPr lang="en-US" dirty="0" smtClean="0">
-                <a:solidFill>
-                  <a:schemeClr val="tx1"/>
-                </a:solidFill>
-              </a:rPr>
-              <a:t>Web Service Provider (AWS S3): $0 up to 20,000 GET Requests otherwise $0.023 per GB and </a:t>
-            </a:r>
-            <a:r>
-              <a:rPr lang="en-US" dirty="0"/>
-              <a:t>$0.004 per 10,000 </a:t>
-            </a:r>
-            <a:r>
-              <a:rPr lang="en-US" dirty="0" smtClean="0"/>
-              <a:t>GET Requests</a:t>
-            </a:r>
-            <a:r>
-              <a:rPr lang="en-US" dirty="0" smtClean="0">
-                <a:solidFill>
-                  <a:schemeClr val="tx1"/>
-                </a:solidFill>
-              </a:rPr>
-              <a:t>.</a:t>
-            </a:r>
-            <a:endParaRPr lang="en-US" dirty="0" smtClean="0">
+              <a:t>of download version.</a:t>
+            </a:r>
+            <a:endParaRPr lang="en-US" dirty="0">
               <a:solidFill>
                 <a:schemeClr val="tx1"/>
               </a:solidFill>
@@ -5692,13 +5836,20 @@
     </p:spTree>
     <p:extLst>
       <p:ext uri="{BB962C8B-B14F-4D97-AF65-F5344CB8AC3E}">
-        <p14:creationId xmlns:p14="http://schemas.microsoft.com/office/powerpoint/2010/main" val="1992923292"/>
+        <p14:creationId xmlns:p14="http://schemas.microsoft.com/office/powerpoint/2010/main" val="1040487182"/>
       </p:ext>
     </p:extLst>
   </p:cSld>
   <p:clrMapOvr>
     <a:masterClrMapping/>
   </p:clrMapOvr>
+  <p:timing>
+    <p:tnLst>
+      <p:par>
+        <p:cTn id="1" dur="indefinite" restart="never" nodeType="tmRoot"/>
+      </p:par>
+    </p:tnLst>
+  </p:timing>
 </p:sld>
 </file>
 

</xml_diff>

<commit_message>
corrected info on firebase costs
</commit_message>
<xml_diff>
--- a/powerpoint/codeDeck.pptx
+++ b/powerpoint/codeDeck.pptx
@@ -116,7 +116,7 @@
   </p:defaultTextStyle>
   <p:extLst>
     <p:ext uri="{EFAFB233-063F-42B5-8137-9DF3F51BA10A}">
-      <p15:sldGuideLst xmlns:p15="http://schemas.microsoft.com/office/powerpoint/2012/main"/>
+      <p15:sldGuideLst xmlns:p15="http://schemas.microsoft.com/office/powerpoint/2012/main" xmlns=""/>
     </p:ext>
   </p:extLst>
 </p:presentation>
@@ -292,7 +292,7 @@
             <a:fld id="{87DE6118-2437-4B30-8E3C-4D2BE6020583}" type="datetimeFigureOut">
               <a:rPr lang="en-US" dirty="0"/>
               <a:pPr/>
-              <a:t>9/4/17</a:t>
+              <a:t>9/5/2017</a:t>
             </a:fld>
             <a:endParaRPr lang="en-US" dirty="0"/>
           </a:p>
@@ -618,7 +618,8 @@
           <a:p>
             <a:fld id="{87DE6118-2437-4B30-8E3C-4D2BE6020583}" type="datetimeFigureOut">
               <a:rPr lang="en-US" dirty="0"/>
-              <a:t>9/4/17</a:t>
+              <a:pPr/>
+              <a:t>9/5/2017</a:t>
             </a:fld>
             <a:endParaRPr lang="en-US" dirty="0"/>
           </a:p>
@@ -660,6 +661,7 @@
           <a:p>
             <a:fld id="{69E57DC2-970A-4B3E-BB1C-7A09969E49DF}" type="slidenum">
               <a:rPr lang="en-US" dirty="0"/>
+              <a:pPr/>
               <a:t>‹#›</a:t>
             </a:fld>
             <a:endParaRPr lang="en-US" dirty="0"/>
@@ -793,7 +795,8 @@
           <a:p>
             <a:fld id="{87DE6118-2437-4B30-8E3C-4D2BE6020583}" type="datetimeFigureOut">
               <a:rPr lang="en-US" dirty="0"/>
-              <a:t>9/4/17</a:t>
+              <a:pPr/>
+              <a:t>9/5/2017</a:t>
             </a:fld>
             <a:endParaRPr lang="en-US" dirty="0"/>
           </a:p>
@@ -835,6 +838,7 @@
           <a:p>
             <a:fld id="{69E57DC2-970A-4B3E-BB1C-7A09969E49DF}" type="slidenum">
               <a:rPr lang="en-US" dirty="0"/>
+              <a:pPr/>
               <a:t>‹#›</a:t>
             </a:fld>
             <a:endParaRPr lang="en-US" dirty="0"/>
@@ -958,7 +962,8 @@
           <a:p>
             <a:fld id="{87DE6118-2437-4B30-8E3C-4D2BE6020583}" type="datetimeFigureOut">
               <a:rPr lang="en-US" dirty="0"/>
-              <a:t>9/4/17</a:t>
+              <a:pPr/>
+              <a:t>9/5/2017</a:t>
             </a:fld>
             <a:endParaRPr lang="en-US" dirty="0"/>
           </a:p>
@@ -1000,6 +1005,7 @@
           <a:p>
             <a:fld id="{69E57DC2-970A-4B3E-BB1C-7A09969E49DF}" type="slidenum">
               <a:rPr lang="en-US" dirty="0"/>
+              <a:pPr/>
               <a:t>‹#›</a:t>
             </a:fld>
             <a:endParaRPr lang="en-US" dirty="0"/>
@@ -1231,7 +1237,7 @@
             <a:fld id="{87DE6118-2437-4B30-8E3C-4D2BE6020583}" type="datetimeFigureOut">
               <a:rPr lang="en-US" dirty="0"/>
               <a:pPr/>
-              <a:t>9/4/17</a:t>
+              <a:t>9/5/2017</a:t>
             </a:fld>
             <a:endParaRPr lang="en-US" dirty="0"/>
           </a:p>
@@ -1308,7 +1314,7 @@
       </p:sp>
       <p:sp>
         <p:nvSpPr>
-          <p:cNvPr id="7" name="Freeform 6" title="Crop Mark"/>
+          <p:cNvPr id="7" name="Freeform 6"/>
           <p:cNvSpPr/>
           <p:nvPr/>
         </p:nvSpPr>
@@ -1621,7 +1627,8 @@
           <a:p>
             <a:fld id="{87DE6118-2437-4B30-8E3C-4D2BE6020583}" type="datetimeFigureOut">
               <a:rPr lang="en-US" dirty="0"/>
-              <a:t>9/4/17</a:t>
+              <a:pPr/>
+              <a:t>9/5/2017</a:t>
             </a:fld>
             <a:endParaRPr lang="en-US" dirty="0"/>
           </a:p>
@@ -1663,6 +1670,7 @@
           <a:p>
             <a:fld id="{69E57DC2-970A-4B3E-BB1C-7A09969E49DF}" type="slidenum">
               <a:rPr lang="en-US" dirty="0"/>
+              <a:pPr/>
               <a:t>‹#›</a:t>
             </a:fld>
             <a:endParaRPr lang="en-US" dirty="0"/>
@@ -2093,7 +2101,8 @@
           <a:p>
             <a:fld id="{87DE6118-2437-4B30-8E3C-4D2BE6020583}" type="datetimeFigureOut">
               <a:rPr lang="en-US" dirty="0"/>
-              <a:t>9/4/17</a:t>
+              <a:pPr/>
+              <a:t>9/5/2017</a:t>
             </a:fld>
             <a:endParaRPr lang="en-US" dirty="0"/>
           </a:p>
@@ -2135,6 +2144,7 @@
           <a:p>
             <a:fld id="{69E57DC2-970A-4B3E-BB1C-7A09969E49DF}" type="slidenum">
               <a:rPr lang="en-US" dirty="0"/>
+              <a:pPr/>
               <a:t>‹#›</a:t>
             </a:fld>
             <a:endParaRPr lang="en-US" dirty="0"/>
@@ -2206,7 +2216,8 @@
           <a:p>
             <a:fld id="{87DE6118-2437-4B30-8E3C-4D2BE6020583}" type="datetimeFigureOut">
               <a:rPr lang="en-US" dirty="0"/>
-              <a:t>9/4/17</a:t>
+              <a:pPr/>
+              <a:t>9/5/2017</a:t>
             </a:fld>
             <a:endParaRPr lang="en-US" dirty="0"/>
           </a:p>
@@ -2248,6 +2259,7 @@
           <a:p>
             <a:fld id="{69E57DC2-970A-4B3E-BB1C-7A09969E49DF}" type="slidenum">
               <a:rPr lang="en-US" dirty="0"/>
+              <a:pPr/>
               <a:t>‹#›</a:t>
             </a:fld>
             <a:endParaRPr lang="en-US" dirty="0"/>
@@ -2296,7 +2308,8 @@
           <a:p>
             <a:fld id="{87DE6118-2437-4B30-8E3C-4D2BE6020583}" type="datetimeFigureOut">
               <a:rPr lang="en-US" dirty="0"/>
-              <a:t>9/4/17</a:t>
+              <a:pPr/>
+              <a:t>9/5/2017</a:t>
             </a:fld>
             <a:endParaRPr lang="en-US" dirty="0"/>
           </a:p>
@@ -2338,6 +2351,7 @@
           <a:p>
             <a:fld id="{69E57DC2-970A-4B3E-BB1C-7A09969E49DF}" type="slidenum">
               <a:rPr lang="en-US" dirty="0"/>
+              <a:pPr/>
               <a:t>‹#›</a:t>
             </a:fld>
             <a:endParaRPr lang="en-US" dirty="0"/>
@@ -2371,7 +2385,7 @@
       </p:grpSpPr>
       <p:sp>
         <p:nvSpPr>
-          <p:cNvPr id="8" name="Rectangle 7" title="Background Shape"/>
+          <p:cNvPr id="8" name="Rectangle 7"/>
           <p:cNvSpPr/>
           <p:nvPr/>
         </p:nvSpPr>
@@ -2638,7 +2652,7 @@
             <a:fld id="{87DE6118-2437-4B30-8E3C-4D2BE6020583}" type="datetimeFigureOut">
               <a:rPr lang="en-US" dirty="0"/>
               <a:pPr/>
-              <a:t>9/4/17</a:t>
+              <a:t>9/5/2017</a:t>
             </a:fld>
             <a:endParaRPr lang="en-US" dirty="0"/>
           </a:p>
@@ -2715,7 +2729,7 @@
       </p:sp>
       <p:sp>
         <p:nvSpPr>
-          <p:cNvPr id="9" name="Rectangle 8" title="Divider Bar"/>
+          <p:cNvPr id="9" name="Rectangle 8"/>
           <p:cNvSpPr/>
           <p:nvPr/>
         </p:nvSpPr>
@@ -2778,7 +2792,7 @@
       </p:grpSpPr>
       <p:sp>
         <p:nvSpPr>
-          <p:cNvPr id="8" name="Rectangle 7" title="Background Shape"/>
+          <p:cNvPr id="8" name="Rectangle 7"/>
           <p:cNvSpPr/>
           <p:nvPr/>
         </p:nvSpPr>
@@ -3023,7 +3037,7 @@
             <a:fld id="{87DE6118-2437-4B30-8E3C-4D2BE6020583}" type="datetimeFigureOut">
               <a:rPr lang="en-US" dirty="0"/>
               <a:pPr/>
-              <a:t>9/4/17</a:t>
+              <a:t>9/5/2017</a:t>
             </a:fld>
             <a:endParaRPr lang="en-US" dirty="0"/>
           </a:p>
@@ -3100,7 +3114,7 @@
       </p:sp>
       <p:sp>
         <p:nvSpPr>
-          <p:cNvPr id="9" name="Rectangle 8" title="Divider Bar"/>
+          <p:cNvPr id="9" name="Rectangle 8"/>
           <p:cNvSpPr/>
           <p:nvPr/>
         </p:nvSpPr>
@@ -3298,7 +3312,7 @@
             <a:fld id="{87DE6118-2437-4B30-8E3C-4D2BE6020583}" type="datetimeFigureOut">
               <a:rPr lang="en-US" dirty="0"/>
               <a:pPr/>
-              <a:t>9/4/17</a:t>
+              <a:t>9/5/2017</a:t>
             </a:fld>
             <a:endParaRPr lang="en-US" dirty="0"/>
           </a:p>
@@ -3381,7 +3395,7 @@
       </p:sp>
       <p:sp>
         <p:nvSpPr>
-          <p:cNvPr id="9" name="Rectangle 8" title="Side bar"/>
+          <p:cNvPr id="9" name="Rectangle 8"/>
           <p:cNvSpPr/>
           <p:nvPr/>
         </p:nvSpPr>
@@ -3742,7 +3756,7 @@
   </p:txStyles>
   <p:extLst mod="1">
     <p:ext uri="{27BBF7A9-308A-43DC-89C8-2F10F3537804}">
-      <p15:sldGuideLst xmlns:p15="http://schemas.microsoft.com/office/powerpoint/2012/main">
+      <p15:sldGuideLst xmlns:p15="http://schemas.microsoft.com/office/powerpoint/2012/main" xmlns="">
         <p15:guide id="3" orient="horz" pos="1368">
           <p15:clr>
             <a:srgbClr val="F26B43"/>
@@ -3859,7 +3873,7 @@
     </p:spTree>
     <p:extLst>
       <p:ext uri="{BB962C8B-B14F-4D97-AF65-F5344CB8AC3E}">
-        <p14:creationId xmlns:p14="http://schemas.microsoft.com/office/powerpoint/2010/main" val="1536980256"/>
+        <p14:creationId xmlns:p14="http://schemas.microsoft.com/office/powerpoint/2010/main" xmlns="" val="1536980256"/>
       </p:ext>
     </p:extLst>
   </p:cSld>
@@ -3947,25 +3961,43 @@
                   <a:schemeClr val="tx1"/>
                 </a:solidFill>
               </a:rPr>
-              <a:t>hours initially</a:t>
-            </a:r>
+              <a:t>hours initially: Estimate of 120 hours total for 4 developers in one week.</a:t>
+            </a:r>
+          </a:p>
+          <a:p>
             <a:r>
               <a:rPr lang="en-US" dirty="0" smtClean="0">
                 <a:solidFill>
                   <a:schemeClr val="tx1"/>
                 </a:solidFill>
               </a:rPr>
-              <a:t>: Estimate of 120 hours total for 4 developers in one week.</a:t>
-            </a:r>
-          </a:p>
-          <a:p>
+              <a:t>Estimated amount of hours ongoing: Estimated 12 hours total for 4 developers.</a:t>
+            </a:r>
+          </a:p>
+          <a:p>
+            <a:r>
+              <a:rPr lang="en-US" dirty="0">
+                <a:solidFill>
+                  <a:schemeClr val="tx1"/>
+                </a:solidFill>
+              </a:rPr>
+              <a:t>C</a:t>
+            </a:r>
             <a:r>
               <a:rPr lang="en-US" dirty="0" smtClean="0">
                 <a:solidFill>
                   <a:schemeClr val="tx1"/>
                 </a:solidFill>
               </a:rPr>
-              <a:t>Estimated </a:t>
+              <a:t>ost </a:t>
+            </a:r>
+            <a:r>
+              <a:rPr lang="en-US" dirty="0">
+                <a:solidFill>
+                  <a:schemeClr val="tx1"/>
+                </a:solidFill>
+              </a:rPr>
+              <a:t>to run application for </a:t>
             </a:r>
             <a:r>
               <a:rPr lang="en-US" dirty="0" smtClean="0">
@@ -3973,15 +4005,57 @@
                   <a:schemeClr val="tx1"/>
                 </a:solidFill>
               </a:rPr>
-              <a:t>amount of hours ongoing</a:t>
-            </a:r>
+              <a:t>demo: $0</a:t>
+            </a:r>
+          </a:p>
+          <a:p>
             <a:r>
               <a:rPr lang="en-US" dirty="0" smtClean="0">
                 <a:solidFill>
                   <a:schemeClr val="tx1"/>
                 </a:solidFill>
               </a:rPr>
-              <a:t>: Estimated 12 hours total for 4 developers.</a:t>
+              <a:t>Firebase: $0 otherwise $</a:t>
+            </a:r>
+            <a:r>
+              <a:rPr lang="en-US" dirty="0" smtClean="0">
+                <a:solidFill>
+                  <a:schemeClr val="tx1"/>
+                </a:solidFill>
+              </a:rPr>
+              <a:t>25/month </a:t>
+            </a:r>
+            <a:r>
+              <a:rPr lang="en-US" dirty="0" smtClean="0">
+                <a:solidFill>
+                  <a:schemeClr val="tx1"/>
+                </a:solidFill>
+              </a:rPr>
+              <a:t>for 100k/instances for simultaneous </a:t>
+            </a:r>
+            <a:r>
+              <a:rPr lang="en-US" dirty="0" smtClean="0">
+                <a:solidFill>
+                  <a:schemeClr val="tx1"/>
+                </a:solidFill>
+              </a:rPr>
+              <a:t>connections, 2.5GB </a:t>
+            </a:r>
+            <a:r>
+              <a:rPr lang="en-US" dirty="0" smtClean="0">
+                <a:solidFill>
+                  <a:schemeClr val="tx1"/>
+                </a:solidFill>
+              </a:rPr>
+              <a:t>for </a:t>
+            </a:r>
+            <a:r>
+              <a:rPr lang="en-US" dirty="0" smtClean="0">
+                <a:solidFill>
+                  <a:schemeClr val="tx1"/>
+                </a:solidFill>
+              </a:rPr>
+              <a:t>storage, and 20 GB downloads/month.</a:t>
             </a:r>
             <a:endParaRPr lang="en-US" dirty="0" smtClean="0">
               <a:solidFill>
@@ -3991,74 +4065,6 @@
           </a:p>
           <a:p>
             <a:r>
-              <a:rPr lang="en-US" dirty="0">
-                <a:solidFill>
-                  <a:schemeClr val="tx1"/>
-                </a:solidFill>
-              </a:rPr>
-              <a:t>C</a:t>
-            </a:r>
-            <a:r>
-              <a:rPr lang="en-US" dirty="0" smtClean="0">
-                <a:solidFill>
-                  <a:schemeClr val="tx1"/>
-                </a:solidFill>
-              </a:rPr>
-              <a:t>ost </a:t>
-            </a:r>
-            <a:r>
-              <a:rPr lang="en-US" dirty="0">
-                <a:solidFill>
-                  <a:schemeClr val="tx1"/>
-                </a:solidFill>
-              </a:rPr>
-              <a:t>to run application for </a:t>
-            </a:r>
-            <a:r>
-              <a:rPr lang="en-US" dirty="0" smtClean="0">
-                <a:solidFill>
-                  <a:schemeClr val="tx1"/>
-                </a:solidFill>
-              </a:rPr>
-              <a:t>demo: $0</a:t>
-            </a:r>
-          </a:p>
-          <a:p>
-            <a:r>
-              <a:rPr lang="en-US" dirty="0" smtClean="0">
-                <a:solidFill>
-                  <a:schemeClr val="tx1"/>
-                </a:solidFill>
-              </a:rPr>
-              <a:t>Firebase: </a:t>
-            </a:r>
-            <a:r>
-              <a:rPr lang="en-US" dirty="0" smtClean="0">
-                <a:solidFill>
-                  <a:schemeClr val="tx1"/>
-                </a:solidFill>
-              </a:rPr>
-              <a:t>$0 </a:t>
-            </a:r>
-            <a:r>
-              <a:rPr lang="en-US" dirty="0" smtClean="0">
-                <a:solidFill>
-                  <a:schemeClr val="tx1"/>
-                </a:solidFill>
-              </a:rPr>
-              <a:t>otherwise $25/year for 100k/instances </a:t>
-            </a:r>
-            <a:r>
-              <a:rPr lang="en-US" dirty="0" smtClean="0">
-                <a:solidFill>
-                  <a:schemeClr val="tx1"/>
-                </a:solidFill>
-              </a:rPr>
-              <a:t>for simultaneous connections and/or 50GB for storage.</a:t>
-            </a:r>
-          </a:p>
-          <a:p>
-            <a:r>
               <a:rPr lang="en-US" dirty="0" smtClean="0">
                 <a:solidFill>
                   <a:schemeClr val="tx1"/>
@@ -4108,7 +4114,7 @@
     </p:spTree>
     <p:extLst>
       <p:ext uri="{BB962C8B-B14F-4D97-AF65-F5344CB8AC3E}">
-        <p14:creationId xmlns:p14="http://schemas.microsoft.com/office/powerpoint/2010/main" val="1992923292"/>
+        <p14:creationId xmlns:p14="http://schemas.microsoft.com/office/powerpoint/2010/main" xmlns="" val="1992923292"/>
       </p:ext>
     </p:extLst>
   </p:cSld>
@@ -4175,39 +4181,14 @@
           <a:p>
             <a:r>
               <a:rPr lang="en-US" dirty="0" smtClean="0"/>
-              <a:t>Identifying API’s </a:t>
-            </a:r>
-            <a:r>
-              <a:rPr lang="en-US" dirty="0" smtClean="0"/>
-              <a:t>that will </a:t>
-            </a:r>
-            <a:r>
-              <a:rPr lang="en-US" dirty="0" smtClean="0"/>
-              <a:t>work </a:t>
-            </a:r>
-            <a:r>
-              <a:rPr lang="en-US" dirty="0" smtClean="0"/>
-              <a:t>within our scope.</a:t>
-            </a:r>
-          </a:p>
-          <a:p>
-            <a:r>
-              <a:rPr lang="en-US" dirty="0" smtClean="0"/>
-              <a:t>Define all basic feature vs all possible additional </a:t>
-            </a:r>
-            <a:r>
-              <a:rPr lang="en-US" dirty="0" smtClean="0"/>
-              <a:t>features (</a:t>
-            </a:r>
-            <a:r>
-              <a:rPr lang="en-US" dirty="0" smtClean="0"/>
-              <a:t>integrate</a:t>
-            </a:r>
-            <a:r>
-              <a:rPr lang="en-US" dirty="0" smtClean="0"/>
-              <a:t> Sprint Planning Meetings and Daily Stand Ups).</a:t>
-            </a:r>
-            <a:endParaRPr lang="en-US" dirty="0" smtClean="0"/>
+              <a:t>Identifying API’s that will work within our scope.</a:t>
+            </a:r>
+          </a:p>
+          <a:p>
+            <a:r>
+              <a:rPr lang="en-US" dirty="0" smtClean="0"/>
+              <a:t>Define all basic feature vs all possible additional features (integrate Sprint Planning Meetings and Daily Stand Ups).</a:t>
+            </a:r>
           </a:p>
           <a:p>
             <a:r>
@@ -4218,32 +4199,15 @@
           <a:p>
             <a:r>
               <a:rPr lang="en-US" dirty="0" smtClean="0"/>
-              <a:t>Learning </a:t>
-            </a:r>
-            <a:r>
-              <a:rPr lang="en-US" dirty="0" smtClean="0"/>
-              <a:t>how to </a:t>
-            </a:r>
-            <a:r>
-              <a:rPr lang="en-US" dirty="0" smtClean="0"/>
-              <a:t>correctly </a:t>
-            </a:r>
-            <a:r>
-              <a:rPr lang="en-US" dirty="0" smtClean="0"/>
-              <a:t>pull and push to </a:t>
-            </a:r>
-            <a:r>
-              <a:rPr lang="en-US" dirty="0" smtClean="0"/>
-              <a:t>branches to ensure no interferences or setbacks.</a:t>
-            </a:r>
-            <a:endParaRPr lang="en-US" dirty="0" smtClean="0"/>
+              <a:t>Learning how to correctly pull and push to branches to ensure no interferences or setbacks.</a:t>
+            </a:r>
           </a:p>
         </p:txBody>
       </p:sp>
     </p:spTree>
     <p:extLst>
       <p:ext uri="{BB962C8B-B14F-4D97-AF65-F5344CB8AC3E}">
-        <p14:creationId xmlns:p14="http://schemas.microsoft.com/office/powerpoint/2010/main" val="1915101970"/>
+        <p14:creationId xmlns:p14="http://schemas.microsoft.com/office/powerpoint/2010/main" xmlns="" val="1915101970"/>
       </p:ext>
     </p:extLst>
   </p:cSld>
@@ -4376,7 +4340,7 @@
     </p:spTree>
     <p:extLst>
       <p:ext uri="{BB962C8B-B14F-4D97-AF65-F5344CB8AC3E}">
-        <p14:creationId xmlns:p14="http://schemas.microsoft.com/office/powerpoint/2010/main" val="2016633862"/>
+        <p14:creationId xmlns:p14="http://schemas.microsoft.com/office/powerpoint/2010/main" xmlns="" val="2016633862"/>
       </p:ext>
     </p:extLst>
   </p:cSld>
@@ -4420,11 +4384,7 @@
           <a:p>
             <a:r>
               <a:rPr lang="en-US" dirty="0" smtClean="0"/>
-              <a:t>Application’s </a:t>
-            </a:r>
-            <a:r>
-              <a:rPr lang="en-US" dirty="0" smtClean="0"/>
-              <a:t>Concepts</a:t>
+              <a:t>Application’s Concepts</a:t>
             </a:r>
             <a:endParaRPr lang="en-US" dirty="0"/>
           </a:p>
@@ -4503,7 +4463,7 @@
     </p:spTree>
     <p:extLst>
       <p:ext uri="{BB962C8B-B14F-4D97-AF65-F5344CB8AC3E}">
-        <p14:creationId xmlns:p14="http://schemas.microsoft.com/office/powerpoint/2010/main" val="1594798827"/>
+        <p14:creationId xmlns:p14="http://schemas.microsoft.com/office/powerpoint/2010/main" xmlns="" val="1594798827"/>
       </p:ext>
     </p:extLst>
   </p:cSld>
@@ -4620,7 +4580,7 @@
     </p:spTree>
     <p:extLst>
       <p:ext uri="{BB962C8B-B14F-4D97-AF65-F5344CB8AC3E}">
-        <p14:creationId xmlns:p14="http://schemas.microsoft.com/office/powerpoint/2010/main" val="587479645"/>
+        <p14:creationId xmlns:p14="http://schemas.microsoft.com/office/powerpoint/2010/main" xmlns="" val="587479645"/>
       </p:ext>
     </p:extLst>
   </p:cSld>
@@ -4767,7 +4727,6 @@
               <a:rPr lang="en-US" dirty="0" smtClean="0"/>
               <a:t>Daily Standups/Sprint Planning Meetings</a:t>
             </a:r>
-            <a:endParaRPr lang="en-US" dirty="0" smtClean="0"/>
           </a:p>
           <a:p>
             <a:pPr lvl="1"/>
@@ -5045,7 +5004,6 @@
               <a:rPr lang="en-US" dirty="0" smtClean="0"/>
               <a:t>Deployment</a:t>
             </a:r>
-            <a:endParaRPr lang="en-US" dirty="0" smtClean="0"/>
           </a:p>
           <a:p>
             <a:pPr lvl="1"/>
@@ -5092,7 +5050,7 @@
     </p:spTree>
     <p:extLst>
       <p:ext uri="{BB962C8B-B14F-4D97-AF65-F5344CB8AC3E}">
-        <p14:creationId xmlns:p14="http://schemas.microsoft.com/office/powerpoint/2010/main" val="1788068256"/>
+        <p14:creationId xmlns:p14="http://schemas.microsoft.com/office/powerpoint/2010/main" xmlns="" val="1788068256"/>
       </p:ext>
     </p:extLst>
   </p:cSld>
@@ -5305,11 +5263,7 @@
             </a:r>
             <a:r>
               <a:rPr lang="en-US" dirty="0" smtClean="0"/>
-              <a:t> Create logo</a:t>
-            </a:r>
-            <a:r>
-              <a:rPr lang="en-US" dirty="0" smtClean="0"/>
-              <a:t>.</a:t>
+              <a:t> Create logo.</a:t>
             </a:r>
           </a:p>
           <a:p>
@@ -5372,7 +5326,7 @@
     </p:spTree>
     <p:extLst>
       <p:ext uri="{BB962C8B-B14F-4D97-AF65-F5344CB8AC3E}">
-        <p14:creationId xmlns:p14="http://schemas.microsoft.com/office/powerpoint/2010/main" val="177022474"/>
+        <p14:creationId xmlns:p14="http://schemas.microsoft.com/office/powerpoint/2010/main" xmlns="" val="177022474"/>
       </p:ext>
     </p:extLst>
   </p:cSld>
@@ -5460,7 +5414,7 @@
     </p:spTree>
     <p:extLst>
       <p:ext uri="{BB962C8B-B14F-4D97-AF65-F5344CB8AC3E}">
-        <p14:creationId xmlns:p14="http://schemas.microsoft.com/office/powerpoint/2010/main" val="1463705858"/>
+        <p14:creationId xmlns:p14="http://schemas.microsoft.com/office/powerpoint/2010/main" xmlns="" val="1463705858"/>
       </p:ext>
     </p:extLst>
   </p:cSld>
@@ -5589,7 +5543,7 @@
     </p:spTree>
     <p:extLst>
       <p:ext uri="{BB962C8B-B14F-4D97-AF65-F5344CB8AC3E}">
-        <p14:creationId xmlns:p14="http://schemas.microsoft.com/office/powerpoint/2010/main" val="1079179021"/>
+        <p14:creationId xmlns:p14="http://schemas.microsoft.com/office/powerpoint/2010/main" xmlns="" val="1079179021"/>
       </p:ext>
     </p:extLst>
   </p:cSld>
@@ -5817,31 +5771,7 @@
                   <a:schemeClr val="tx1"/>
                 </a:solidFill>
               </a:rPr>
-              <a:t>We w</a:t>
-            </a:r>
-            <a:r>
-              <a:rPr lang="en-US" dirty="0" smtClean="0">
-                <a:solidFill>
-                  <a:schemeClr val="tx1"/>
-                </a:solidFill>
-              </a:rPr>
-              <a:t>ill offer </a:t>
-            </a:r>
-            <a:r>
-              <a:rPr lang="en-US" dirty="0" smtClean="0">
-                <a:solidFill>
-                  <a:schemeClr val="tx1"/>
-                </a:solidFill>
-              </a:rPr>
-              <a:t>online version on top </a:t>
-            </a:r>
-            <a:r>
-              <a:rPr lang="en-US" dirty="0" smtClean="0">
-                <a:solidFill>
-                  <a:schemeClr val="tx1"/>
-                </a:solidFill>
-              </a:rPr>
-              <a:t>of download version.</a:t>
+              <a:t>We will offer online version on top of download version.</a:t>
             </a:r>
             <a:endParaRPr lang="en-US" dirty="0">
               <a:solidFill>
@@ -5854,7 +5784,7 @@
     </p:spTree>
     <p:extLst>
       <p:ext uri="{BB962C8B-B14F-4D97-AF65-F5344CB8AC3E}">
-        <p14:creationId xmlns:p14="http://schemas.microsoft.com/office/powerpoint/2010/main" val="1040487182"/>
+        <p14:creationId xmlns:p14="http://schemas.microsoft.com/office/powerpoint/2010/main" xmlns="" val="1040487182"/>
       </p:ext>
     </p:extLst>
   </p:cSld>
@@ -5914,7 +5844,7 @@
     </a:clrScheme>
     <a:fontScheme name="Crop">
       <a:majorFont>
-        <a:latin typeface="Franklin Gothic Book" panose="020B0503020102020204"/>
+        <a:latin typeface="Franklin Gothic Book"/>
         <a:ea typeface=""/>
         <a:cs typeface=""/>
         <a:font script="Jpan" typeface="メイリオ"/>
@@ -5949,7 +5879,7 @@
         <a:font script="Geor" typeface="Sylfaen"/>
       </a:majorFont>
       <a:minorFont>
-        <a:latin typeface="Franklin Gothic Book" panose="020B0503020102020204"/>
+        <a:latin typeface="Franklin Gothic Book"/>
         <a:ea typeface=""/>
         <a:cs typeface=""/>
         <a:font script="Jpan" typeface="メイリオ"/>
@@ -6123,7 +6053,7 @@
   <a:extraClrSchemeLst/>
   <a:extLst>
     <a:ext uri="{05A4C25C-085E-4340-85A3-A5531E510DB2}">
-      <thm15:themeFamily xmlns:thm15="http://schemas.microsoft.com/office/thememl/2012/main" name="Crop" id="{EC9488ED-E761-4D60-9AC4-764D1FE2C171}" vid="{CE19780C-D67D-4C13-9DE9-A52BC3BA51B4}"/>
+      <thm15:themeFamily xmlns:thm15="http://schemas.microsoft.com/office/thememl/2012/main" xmlns="" name="Crop" id="{EC9488ED-E761-4D60-9AC4-764D1FE2C171}" vid="{CE19780C-D67D-4C13-9DE9-A52BC3BA51B4}"/>
     </a:ext>
   </a:extLst>
 </a:theme>

</xml_diff>